<commit_message>
finished slide alberi evolutivi
</commit_message>
<xml_diff>
--- a/Discussione Laurea/Slides.pptx
+++ b/Discussione Laurea/Slides.pptx
@@ -4438,7 +4438,7 @@
         </p:nvSpPr>
         <p:spPr>
           <a:xfrm>
-            <a:off x="9061" y="1454686"/>
+            <a:off x="9061" y="1649996"/>
             <a:ext cx="9134939" cy="307777"/>
           </a:xfrm>
           <a:prstGeom prst="rect">
@@ -4665,7 +4665,7 @@
         </p:nvSpPr>
         <p:spPr>
           <a:xfrm>
-            <a:off x="5376004" y="1869423"/>
+            <a:off x="5376004" y="2064733"/>
             <a:ext cx="3412021" cy="523220"/>
           </a:xfrm>
           <a:prstGeom prst="rect">
@@ -4714,7 +4714,7 @@
         </p:blipFill>
         <p:spPr>
           <a:xfrm>
-            <a:off x="9061" y="1762463"/>
+            <a:off x="9061" y="1957773"/>
             <a:ext cx="5203627" cy="1250740"/>
           </a:xfrm>
           <a:prstGeom prst="rect">
@@ -4736,7 +4736,7 @@
         </p:nvSpPr>
         <p:spPr>
           <a:xfrm>
-            <a:off x="5376004" y="2329841"/>
+            <a:off x="5376004" y="2525151"/>
             <a:ext cx="3412021" cy="1169551"/>
           </a:xfrm>
           <a:prstGeom prst="rect">
@@ -4830,7 +4830,7 @@
         </p:nvSpPr>
         <p:spPr>
           <a:xfrm>
-            <a:off x="1790498" y="5392230"/>
+            <a:off x="1790498" y="5587540"/>
             <a:ext cx="2974019" cy="307777"/>
           </a:xfrm>
           <a:prstGeom prst="rect">
@@ -4868,7 +4868,7 @@
         </p:nvSpPr>
         <p:spPr>
           <a:xfrm>
-            <a:off x="4672111" y="5440673"/>
+            <a:off x="4672111" y="5635983"/>
             <a:ext cx="825624" cy="210890"/>
           </a:xfrm>
           <a:prstGeom prst="rightArrow">
@@ -4912,7 +4912,7 @@
         </p:nvSpPr>
         <p:spPr>
           <a:xfrm>
-            <a:off x="5615326" y="5386326"/>
+            <a:off x="5615326" y="5581636"/>
             <a:ext cx="1387860" cy="307777"/>
           </a:xfrm>
           <a:prstGeom prst="rect">
@@ -4950,7 +4950,7 @@
         </p:nvSpPr>
         <p:spPr>
           <a:xfrm>
-            <a:off x="368801" y="4465532"/>
+            <a:off x="-9061" y="4636273"/>
             <a:ext cx="9134939" cy="307777"/>
           </a:xfrm>
           <a:prstGeom prst="rect">
@@ -4964,6 +4964,7 @@
           </a:bodyPr>
           <a:lstStyle/>
           <a:p>
+            <a:pPr algn="ctr"/>
             <a:r>
               <a:rPr lang="it-IT" sz="1400" dirty="0">
                 <a:latin typeface="Arial" panose="020B0604020202020204" pitchFamily="34" charset="0"/>
@@ -5880,7 +5881,425 @@
                 <a:latin typeface="Arial" panose="020B0604020202020204" pitchFamily="34" charset="0"/>
                 <a:cs typeface="Arial" panose="020B0604020202020204" pitchFamily="34" charset="0"/>
               </a:rPr>
-              <a:t>È un diagramma che rappresenta le relazioni evolutive tra le varie entità biologiche (animali, piante, virus e così via).</a:t>
+              <a:t>È un diagramma che rappresenta le relazioni evolutive tra le varie entità biologiche, dove i nodi (o vertici) rappresentano tali entità, mentre gli archi mostrano loro relazioni tra di loro.</a:t>
+            </a:r>
+          </a:p>
+        </p:txBody>
+      </p:sp>
+      <p:sp>
+        <p:nvSpPr>
+          <p:cNvPr id="9" name="CasellaDiTesto 8">
+            <a:extLst>
+              <a:ext uri="{FF2B5EF4-FFF2-40B4-BE49-F238E27FC236}">
+                <a16:creationId xmlns:a16="http://schemas.microsoft.com/office/drawing/2014/main" id="{163F6BF4-0428-413E-A1B3-7C53EF9D3236}"/>
+              </a:ext>
+            </a:extLst>
+          </p:cNvPr>
+          <p:cNvSpPr txBox="1"/>
+          <p:nvPr/>
+        </p:nvSpPr>
+        <p:spPr>
+          <a:xfrm>
+            <a:off x="9061" y="1842229"/>
+            <a:ext cx="9125878" cy="307777"/>
+          </a:xfrm>
+          <a:prstGeom prst="rect">
+            <a:avLst/>
+          </a:prstGeom>
+          <a:noFill/>
+        </p:spPr>
+        <p:txBody>
+          <a:bodyPr wrap="square" rtlCol="0">
+            <a:spAutoFit/>
+          </a:bodyPr>
+          <a:lstStyle/>
+          <a:p>
+            <a:pPr algn="ctr"/>
+            <a:r>
+              <a:rPr lang="it-IT" sz="1400" dirty="0">
+                <a:latin typeface="Arial" panose="020B0604020202020204" pitchFamily="34" charset="0"/>
+                <a:cs typeface="Arial" panose="020B0604020202020204" pitchFamily="34" charset="0"/>
+              </a:rPr>
+              <a:t>Due tipi di albero</a:t>
+            </a:r>
+          </a:p>
+        </p:txBody>
+      </p:sp>
+      <p:pic>
+        <p:nvPicPr>
+          <p:cNvPr id="3" name="Immagine 2">
+            <a:extLst>
+              <a:ext uri="{FF2B5EF4-FFF2-40B4-BE49-F238E27FC236}">
+                <a16:creationId xmlns:a16="http://schemas.microsoft.com/office/drawing/2014/main" id="{7EAA9263-AF48-4E85-8354-5AF6EC99A324}"/>
+              </a:ext>
+            </a:extLst>
+          </p:cNvPr>
+          <p:cNvPicPr>
+            <a:picLocks noChangeAspect="1"/>
+          </p:cNvPicPr>
+          <p:nvPr/>
+        </p:nvPicPr>
+        <p:blipFill>
+          <a:blip r:embed="rId4"/>
+          <a:stretch>
+            <a:fillRect/>
+          </a:stretch>
+        </p:blipFill>
+        <p:spPr>
+          <a:xfrm>
+            <a:off x="59577" y="2731897"/>
+            <a:ext cx="4210763" cy="2032200"/>
+          </a:xfrm>
+          <a:prstGeom prst="rect">
+            <a:avLst/>
+          </a:prstGeom>
+        </p:spPr>
+      </p:pic>
+      <p:sp>
+        <p:nvSpPr>
+          <p:cNvPr id="4" name="Freccia a destra 3">
+            <a:extLst>
+              <a:ext uri="{FF2B5EF4-FFF2-40B4-BE49-F238E27FC236}">
+                <a16:creationId xmlns:a16="http://schemas.microsoft.com/office/drawing/2014/main" id="{B3D315B6-F320-487D-9E09-282E3DDD6A94}"/>
+              </a:ext>
+            </a:extLst>
+          </p:cNvPr>
+          <p:cNvSpPr/>
+          <p:nvPr/>
+        </p:nvSpPr>
+        <p:spPr>
+          <a:xfrm rot="8445387">
+            <a:off x="3388147" y="2206158"/>
+            <a:ext cx="559145" cy="175395"/>
+          </a:xfrm>
+          <a:prstGeom prst="rightArrow">
+            <a:avLst/>
+          </a:prstGeom>
+        </p:spPr>
+        <p:style>
+          <a:lnRef idx="1">
+            <a:schemeClr val="accent1"/>
+          </a:lnRef>
+          <a:fillRef idx="3">
+            <a:schemeClr val="accent1"/>
+          </a:fillRef>
+          <a:effectRef idx="2">
+            <a:schemeClr val="accent1"/>
+          </a:effectRef>
+          <a:fontRef idx="minor">
+            <a:schemeClr val="lt1"/>
+          </a:fontRef>
+        </p:style>
+        <p:txBody>
+          <a:bodyPr rtlCol="0" anchor="ctr"/>
+          <a:lstStyle/>
+          <a:p>
+            <a:pPr algn="ctr"/>
+            <a:endParaRPr lang="it-IT"/>
+          </a:p>
+        </p:txBody>
+      </p:sp>
+      <p:sp>
+        <p:nvSpPr>
+          <p:cNvPr id="13" name="CasellaDiTesto 12">
+            <a:extLst>
+              <a:ext uri="{FF2B5EF4-FFF2-40B4-BE49-F238E27FC236}">
+                <a16:creationId xmlns:a16="http://schemas.microsoft.com/office/drawing/2014/main" id="{2FB32206-4F7B-4BF3-A1CD-F66349CBD741}"/>
+              </a:ext>
+            </a:extLst>
+          </p:cNvPr>
+          <p:cNvSpPr txBox="1"/>
+          <p:nvPr/>
+        </p:nvSpPr>
+        <p:spPr>
+          <a:xfrm>
+            <a:off x="706840" y="2445538"/>
+            <a:ext cx="2960879" cy="307777"/>
+          </a:xfrm>
+          <a:prstGeom prst="rect">
+            <a:avLst/>
+          </a:prstGeom>
+          <a:noFill/>
+        </p:spPr>
+        <p:txBody>
+          <a:bodyPr wrap="square" rtlCol="0">
+            <a:spAutoFit/>
+          </a:bodyPr>
+          <a:lstStyle/>
+          <a:p>
+            <a:pPr algn="ctr"/>
+            <a:r>
+              <a:rPr lang="it-IT" sz="1400" i="1" dirty="0">
+                <a:latin typeface="Arial" panose="020B0604020202020204" pitchFamily="34" charset="0"/>
+                <a:cs typeface="Arial" panose="020B0604020202020204" pitchFamily="34" charset="0"/>
+              </a:rPr>
+              <a:t>Albero radicato (o con radice)</a:t>
+            </a:r>
+          </a:p>
+        </p:txBody>
+      </p:sp>
+      <p:pic>
+        <p:nvPicPr>
+          <p:cNvPr id="5" name="Immagine 4">
+            <a:extLst>
+              <a:ext uri="{FF2B5EF4-FFF2-40B4-BE49-F238E27FC236}">
+                <a16:creationId xmlns:a16="http://schemas.microsoft.com/office/drawing/2014/main" id="{CF934D1B-534B-4BD7-BACB-82BE35670754}"/>
+              </a:ext>
+            </a:extLst>
+          </p:cNvPr>
+          <p:cNvPicPr>
+            <a:picLocks noChangeAspect="1"/>
+          </p:cNvPicPr>
+          <p:nvPr/>
+        </p:nvPicPr>
+        <p:blipFill rotWithShape="1">
+          <a:blip r:embed="rId5"/>
+          <a:srcRect l="52842" r="6575" b="8228"/>
+          <a:stretch/>
+        </p:blipFill>
+        <p:spPr>
+          <a:xfrm>
+            <a:off x="5856339" y="2742606"/>
+            <a:ext cx="2573196" cy="2010782"/>
+          </a:xfrm>
+          <a:prstGeom prst="rect">
+            <a:avLst/>
+          </a:prstGeom>
+        </p:spPr>
+      </p:pic>
+      <p:sp>
+        <p:nvSpPr>
+          <p:cNvPr id="16" name="Freccia a destra 15">
+            <a:extLst>
+              <a:ext uri="{FF2B5EF4-FFF2-40B4-BE49-F238E27FC236}">
+                <a16:creationId xmlns:a16="http://schemas.microsoft.com/office/drawing/2014/main" id="{0213C04C-B1FC-4873-8386-922B94D62A55}"/>
+              </a:ext>
+            </a:extLst>
+          </p:cNvPr>
+          <p:cNvSpPr/>
+          <p:nvPr/>
+        </p:nvSpPr>
+        <p:spPr>
+          <a:xfrm rot="2406174">
+            <a:off x="5196710" y="2206158"/>
+            <a:ext cx="559145" cy="175395"/>
+          </a:xfrm>
+          <a:prstGeom prst="rightArrow">
+            <a:avLst/>
+          </a:prstGeom>
+        </p:spPr>
+        <p:style>
+          <a:lnRef idx="1">
+            <a:schemeClr val="accent1"/>
+          </a:lnRef>
+          <a:fillRef idx="3">
+            <a:schemeClr val="accent1"/>
+          </a:fillRef>
+          <a:effectRef idx="2">
+            <a:schemeClr val="accent1"/>
+          </a:effectRef>
+          <a:fontRef idx="minor">
+            <a:schemeClr val="lt1"/>
+          </a:fontRef>
+        </p:style>
+        <p:txBody>
+          <a:bodyPr rtlCol="0" anchor="ctr"/>
+          <a:lstStyle/>
+          <a:p>
+            <a:pPr algn="ctr"/>
+            <a:endParaRPr lang="it-IT"/>
+          </a:p>
+        </p:txBody>
+      </p:sp>
+      <p:sp>
+        <p:nvSpPr>
+          <p:cNvPr id="17" name="CasellaDiTesto 16">
+            <a:extLst>
+              <a:ext uri="{FF2B5EF4-FFF2-40B4-BE49-F238E27FC236}">
+                <a16:creationId xmlns:a16="http://schemas.microsoft.com/office/drawing/2014/main" id="{403D695C-2A85-4C44-BCE4-B5ADFC878D38}"/>
+              </a:ext>
+            </a:extLst>
+          </p:cNvPr>
+          <p:cNvSpPr txBox="1"/>
+          <p:nvPr/>
+        </p:nvSpPr>
+        <p:spPr>
+          <a:xfrm>
+            <a:off x="5592061" y="2445538"/>
+            <a:ext cx="3101752" cy="307777"/>
+          </a:xfrm>
+          <a:prstGeom prst="rect">
+            <a:avLst/>
+          </a:prstGeom>
+          <a:noFill/>
+        </p:spPr>
+        <p:txBody>
+          <a:bodyPr wrap="square" rtlCol="0">
+            <a:spAutoFit/>
+          </a:bodyPr>
+          <a:lstStyle/>
+          <a:p>
+            <a:pPr algn="ctr"/>
+            <a:r>
+              <a:rPr lang="it-IT" sz="1400" i="1" dirty="0">
+                <a:latin typeface="Arial" panose="020B0604020202020204" pitchFamily="34" charset="0"/>
+                <a:cs typeface="Arial" panose="020B0604020202020204" pitchFamily="34" charset="0"/>
+              </a:rPr>
+              <a:t>Albero non radicato (o senza radice)</a:t>
+            </a:r>
+          </a:p>
+        </p:txBody>
+      </p:sp>
+      <p:sp>
+        <p:nvSpPr>
+          <p:cNvPr id="18" name="CasellaDiTesto 17">
+            <a:extLst>
+              <a:ext uri="{FF2B5EF4-FFF2-40B4-BE49-F238E27FC236}">
+                <a16:creationId xmlns:a16="http://schemas.microsoft.com/office/drawing/2014/main" id="{B60E9484-6610-469C-876A-9B487BBFC61D}"/>
+              </a:ext>
+            </a:extLst>
+          </p:cNvPr>
+          <p:cNvSpPr txBox="1"/>
+          <p:nvPr/>
+        </p:nvSpPr>
+        <p:spPr>
+          <a:xfrm>
+            <a:off x="9061" y="4733897"/>
+            <a:ext cx="4210763" cy="1384995"/>
+          </a:xfrm>
+          <a:prstGeom prst="rect">
+            <a:avLst/>
+          </a:prstGeom>
+          <a:noFill/>
+        </p:spPr>
+        <p:txBody>
+          <a:bodyPr wrap="square" rtlCol="0">
+            <a:spAutoFit/>
+          </a:bodyPr>
+          <a:lstStyle/>
+          <a:p>
+            <a:pPr marL="285750" indent="-285750">
+              <a:buFont typeface="Arial" panose="020B0604020202020204" pitchFamily="34" charset="0"/>
+              <a:buChar char="•"/>
+            </a:pPr>
+            <a:r>
+              <a:rPr lang="it-IT" sz="1400" dirty="0">
+                <a:latin typeface="Arial" panose="020B0604020202020204" pitchFamily="34" charset="0"/>
+                <a:cs typeface="Arial" panose="020B0604020202020204" pitchFamily="34" charset="0"/>
+              </a:rPr>
+              <a:t>Nodo speciale, chiamato radice;</a:t>
+            </a:r>
+          </a:p>
+          <a:p>
+            <a:pPr marL="285750" indent="-285750">
+              <a:buFont typeface="Arial" panose="020B0604020202020204" pitchFamily="34" charset="0"/>
+              <a:buChar char="•"/>
+            </a:pPr>
+            <a:r>
+              <a:rPr lang="it-IT" sz="1400" dirty="0">
+                <a:latin typeface="Arial" panose="020B0604020202020204" pitchFamily="34" charset="0"/>
+                <a:cs typeface="Arial" panose="020B0604020202020204" pitchFamily="34" charset="0"/>
+              </a:rPr>
+              <a:t>Vertici (nodi interni) con grado maggiore di 1 sono gli antenati;</a:t>
+            </a:r>
+          </a:p>
+          <a:p>
+            <a:pPr marL="285750" indent="-285750">
+              <a:buFont typeface="Arial" panose="020B0604020202020204" pitchFamily="34" charset="0"/>
+              <a:buChar char="•"/>
+            </a:pPr>
+            <a:r>
+              <a:rPr lang="it-IT" sz="1400" dirty="0">
+                <a:latin typeface="Arial" panose="020B0604020202020204" pitchFamily="34" charset="0"/>
+                <a:cs typeface="Arial" panose="020B0604020202020204" pitchFamily="34" charset="0"/>
+              </a:rPr>
+              <a:t>Vertici (foglie) con grado 1 sono le specie attualmente esistenti;</a:t>
+            </a:r>
+          </a:p>
+          <a:p>
+            <a:r>
+              <a:rPr lang="it-IT" sz="1400" dirty="0">
+                <a:latin typeface="Arial" panose="020B0604020202020204" pitchFamily="34" charset="0"/>
+                <a:cs typeface="Arial" panose="020B0604020202020204" pitchFamily="34" charset="0"/>
+              </a:rPr>
+              <a:t>Quindi la radice è l’antenato comune a tutti i vertici.</a:t>
+            </a:r>
+          </a:p>
+        </p:txBody>
+      </p:sp>
+      <p:sp>
+        <p:nvSpPr>
+          <p:cNvPr id="19" name="CasellaDiTesto 18">
+            <a:extLst>
+              <a:ext uri="{FF2B5EF4-FFF2-40B4-BE49-F238E27FC236}">
+                <a16:creationId xmlns:a16="http://schemas.microsoft.com/office/drawing/2014/main" id="{81405EB9-6F38-4F75-8441-F0F3DBC799FA}"/>
+              </a:ext>
+            </a:extLst>
+          </p:cNvPr>
+          <p:cNvSpPr txBox="1"/>
+          <p:nvPr/>
+        </p:nvSpPr>
+        <p:spPr>
+          <a:xfrm>
+            <a:off x="4734255" y="4767671"/>
+            <a:ext cx="4409746" cy="1169551"/>
+          </a:xfrm>
+          <a:prstGeom prst="rect">
+            <a:avLst/>
+          </a:prstGeom>
+          <a:noFill/>
+        </p:spPr>
+        <p:txBody>
+          <a:bodyPr wrap="square" rtlCol="0">
+            <a:spAutoFit/>
+          </a:bodyPr>
+          <a:lstStyle/>
+          <a:p>
+            <a:pPr marL="285750" indent="-285750">
+              <a:buFont typeface="Arial" panose="020B0604020202020204" pitchFamily="34" charset="0"/>
+              <a:buChar char="•"/>
+            </a:pPr>
+            <a:r>
+              <a:rPr lang="it-IT" sz="1400" dirty="0">
+                <a:latin typeface="Arial" panose="020B0604020202020204" pitchFamily="34" charset="0"/>
+                <a:cs typeface="Arial" panose="020B0604020202020204" pitchFamily="34" charset="0"/>
+              </a:rPr>
+              <a:t>Alberi senza la radice;</a:t>
+            </a:r>
+          </a:p>
+          <a:p>
+            <a:pPr marL="285750" indent="-285750">
+              <a:buFont typeface="Arial" panose="020B0604020202020204" pitchFamily="34" charset="0"/>
+              <a:buChar char="•"/>
+            </a:pPr>
+            <a:r>
+              <a:rPr lang="it-IT" sz="1400" dirty="0">
+                <a:latin typeface="Arial" panose="020B0604020202020204" pitchFamily="34" charset="0"/>
+                <a:cs typeface="Arial" panose="020B0604020202020204" pitchFamily="34" charset="0"/>
+              </a:rPr>
+              <a:t>Vertici con grado maggiore di 1 sono i nodi interni;</a:t>
+            </a:r>
+          </a:p>
+          <a:p>
+            <a:pPr marL="285750" indent="-285750">
+              <a:buFont typeface="Arial" panose="020B0604020202020204" pitchFamily="34" charset="0"/>
+              <a:buChar char="•"/>
+            </a:pPr>
+            <a:r>
+              <a:rPr lang="it-IT" sz="1400" dirty="0">
+                <a:latin typeface="Arial" panose="020B0604020202020204" pitchFamily="34" charset="0"/>
+                <a:cs typeface="Arial" panose="020B0604020202020204" pitchFamily="34" charset="0"/>
+              </a:rPr>
+              <a:t>Vertici con grado 1 sono dette foglie;</a:t>
+            </a:r>
+          </a:p>
+          <a:p>
+            <a:r>
+              <a:rPr lang="it-IT" sz="1400" dirty="0">
+                <a:latin typeface="Arial" panose="020B0604020202020204" pitchFamily="34" charset="0"/>
+                <a:cs typeface="Arial" panose="020B0604020202020204" pitchFamily="34" charset="0"/>
+              </a:rPr>
+              <a:t>Usati per mostrare le relazioni tra le entità piuttosto che mostrare l’antenato comune a tutti.</a:t>
             </a:r>
           </a:p>
         </p:txBody>

</xml_diff>

<commit_message>
finished slide problema degli alberi basati sulla distanza
</commit_message>
<xml_diff>
--- a/Discussione Laurea/Slides.pptx
+++ b/Discussione Laurea/Slides.pptx
@@ -4156,8 +4156,8 @@
         </p:nvSpPr>
         <p:spPr>
           <a:xfrm>
-            <a:off x="4796503" y="4590468"/>
-            <a:ext cx="3748014" cy="338554"/>
+            <a:off x="5020924" y="4590468"/>
+            <a:ext cx="3523593" cy="338554"/>
           </a:xfrm>
           <a:prstGeom prst="rect">
             <a:avLst/>
@@ -4172,7 +4172,7 @@
           <a:p>
             <a:pPr algn="r"/>
             <a:r>
-              <a:rPr lang="it-IT" sz="1600" b="1" dirty="0">
+              <a:rPr lang="it-IT" sz="1600" dirty="0">
                 <a:latin typeface=""/>
               </a:rPr>
               <a:t>Relatrice Prof.ssa Maria Cecilia Verri</a:t>
@@ -6291,6 +6291,44 @@
           </a:fontRef>
         </p:style>
       </p:cxnSp>
+      <p:sp>
+        <p:nvSpPr>
+          <p:cNvPr id="21" name="CasellaDiTesto 20">
+            <a:extLst>
+              <a:ext uri="{FF2B5EF4-FFF2-40B4-BE49-F238E27FC236}">
+                <a16:creationId xmlns:a16="http://schemas.microsoft.com/office/drawing/2014/main" id="{4181822D-53CA-4487-8406-D2566F498455}"/>
+              </a:ext>
+            </a:extLst>
+          </p:cNvPr>
+          <p:cNvSpPr txBox="1"/>
+          <p:nvPr/>
+        </p:nvSpPr>
+        <p:spPr>
+          <a:xfrm>
+            <a:off x="2670148" y="6209709"/>
+            <a:ext cx="3803517" cy="307777"/>
+          </a:xfrm>
+          <a:prstGeom prst="rect">
+            <a:avLst/>
+          </a:prstGeom>
+          <a:noFill/>
+        </p:spPr>
+        <p:txBody>
+          <a:bodyPr wrap="square" rtlCol="0">
+            <a:spAutoFit/>
+          </a:bodyPr>
+          <a:lstStyle/>
+          <a:p>
+            <a:r>
+              <a:rPr lang="it-IT" sz="1400" b="1" dirty="0">
+                <a:latin typeface="Arial" panose="020B0604020202020204" pitchFamily="34" charset="0"/>
+                <a:cs typeface="Arial" panose="020B0604020202020204" pitchFamily="34" charset="0"/>
+              </a:rPr>
+              <a:t>Come si costruiscono gli alberi evolutivi?</a:t>
+            </a:r>
+          </a:p>
+        </p:txBody>
+      </p:sp>
     </p:spTree>
     <p:extLst>
       <p:ext uri="{BB962C8B-B14F-4D97-AF65-F5344CB8AC3E}">
@@ -6354,7 +6392,7 @@
         <p:spPr>
           <a:xfrm>
             <a:off x="9061" y="649703"/>
-            <a:ext cx="6737968" cy="461665"/>
+            <a:ext cx="3373331" cy="461665"/>
           </a:xfrm>
           <a:prstGeom prst="rect">
             <a:avLst/>
@@ -6377,7 +6415,7 @@
                 <a:latin typeface="Arial"/>
                 <a:cs typeface="Arial"/>
               </a:rPr>
-              <a:t>Problema degli alberi basati sulla distanza</a:t>
+              <a:t>Matrice delle distanze</a:t>
             </a:r>
           </a:p>
         </p:txBody>
@@ -7265,8 +7303,8 @@
             </p:nvSpPr>
             <p:spPr>
               <a:xfrm>
-                <a:off x="280081" y="3873674"/>
-                <a:ext cx="8526702" cy="307777"/>
+                <a:off x="162205" y="3873674"/>
+                <a:ext cx="8828096" cy="307777"/>
               </a:xfrm>
               <a:prstGeom prst="rect">
                 <a:avLst/>
@@ -7309,7 +7347,25 @@
                     <a:latin typeface="Arial" panose="020B0604020202020204" pitchFamily="34" charset="0"/>
                     <a:cs typeface="Arial" panose="020B0604020202020204" pitchFamily="34" charset="0"/>
                   </a:rPr>
-                  <a:t>matrice delle distanze </a:t>
+                  <a:t>matrice </a:t>
+                </a:r>
+                <a14:m>
+                  <m:oMath xmlns:m="http://schemas.openxmlformats.org/officeDocument/2006/math">
+                    <m:r>
+                      <a:rPr lang="it-IT" sz="1400" i="1" dirty="0" smtClean="0">
+                        <a:latin typeface="Cambria Math" panose="02040503050406030204" pitchFamily="18" charset="0"/>
+                        <a:cs typeface="Arial" panose="020B0604020202020204" pitchFamily="34" charset="0"/>
+                      </a:rPr>
+                      <m:t>𝐷</m:t>
+                    </m:r>
+                  </m:oMath>
+                </a14:m>
+                <a:r>
+                  <a:rPr lang="it-IT" sz="1400" i="1" dirty="0">
+                    <a:latin typeface="Arial" panose="020B0604020202020204" pitchFamily="34" charset="0"/>
+                    <a:cs typeface="Arial" panose="020B0604020202020204" pitchFamily="34" charset="0"/>
+                  </a:rPr>
+                  <a:t> delle distanze </a:t>
                 </a:r>
                 <a14:m>
                   <m:oMath xmlns:m="http://schemas.openxmlformats.org/officeDocument/2006/math">
@@ -7371,8 +7427,8 @@
             </p:nvSpPr>
             <p:spPr>
               <a:xfrm>
-                <a:off x="280081" y="3873674"/>
-                <a:ext cx="8526702" cy="307777"/>
+                <a:off x="162205" y="3873674"/>
+                <a:ext cx="8828096" cy="307777"/>
               </a:xfrm>
               <a:prstGeom prst="rect">
                 <a:avLst/>
@@ -7380,7 +7436,7 @@
               <a:blipFill>
                 <a:blip r:embed="rId13"/>
                 <a:stretch>
-                  <a:fillRect l="-214" t="-1961" b="-19608"/>
+                  <a:fillRect l="-207" t="-1961" b="-19608"/>
                 </a:stretch>
               </a:blipFill>
             </p:spPr>
@@ -7478,15 +7534,16 @@
             </a:extLst>
           </p:cNvPr>
           <p:cNvCxnSpPr>
+            <a:cxnSpLocks/>
             <a:stCxn id="23" idx="2"/>
             <a:endCxn id="25" idx="0"/>
           </p:cNvCxnSpPr>
           <p:nvPr/>
         </p:nvCxnSpPr>
         <p:spPr>
-          <a:xfrm rot="16200000" flipH="1">
-            <a:off x="4407123" y="4317759"/>
-            <a:ext cx="272619" cy="1"/>
+          <a:xfrm rot="5400000">
+            <a:off x="4423534" y="4301350"/>
+            <a:ext cx="272619" cy="32820"/>
           </a:xfrm>
           <a:prstGeom prst="bentConnector3">
             <a:avLst/>
@@ -7549,7 +7606,7 @@
           <p:nvPr/>
         </p:nvPicPr>
         <p:blipFill>
-          <a:blip r:embed="rId3"/>
+          <a:blip r:embed="rId4"/>
           <a:stretch>
             <a:fillRect/>
           </a:stretch>
@@ -7762,12 +7819,654 @@
           </a:p>
         </p:txBody>
       </p:sp>
-      <p:sp>
-        <p:nvSpPr>
-          <p:cNvPr id="20" name="CasellaDiTesto 19">
+      <p:pic>
+        <p:nvPicPr>
+          <p:cNvPr id="3" name="Immagine 2">
             <a:extLst>
               <a:ext uri="{FF2B5EF4-FFF2-40B4-BE49-F238E27FC236}">
-                <a16:creationId xmlns:a16="http://schemas.microsoft.com/office/drawing/2014/main" id="{6D402DA8-573C-45EA-B7E1-EE986DF5362A}"/>
+                <a16:creationId xmlns:a16="http://schemas.microsoft.com/office/drawing/2014/main" id="{B73FB786-FDF9-4EA0-B536-B98D883F3AEC}"/>
+              </a:ext>
+            </a:extLst>
+          </p:cNvPr>
+          <p:cNvPicPr>
+            <a:picLocks noChangeAspect="1"/>
+          </p:cNvPicPr>
+          <p:nvPr/>
+        </p:nvPicPr>
+        <p:blipFill rotWithShape="1">
+          <a:blip r:embed="rId5"/>
+          <a:srcRect t="3148" r="2363" b="3121"/>
+          <a:stretch/>
+        </p:blipFill>
+        <p:spPr>
+          <a:xfrm>
+            <a:off x="4078663" y="1263488"/>
+            <a:ext cx="4803886" cy="2254928"/>
+          </a:xfrm>
+          <a:prstGeom prst="rect">
+            <a:avLst/>
+          </a:prstGeom>
+        </p:spPr>
+      </p:pic>
+      <mc:AlternateContent xmlns:mc="http://schemas.openxmlformats.org/markup-compatibility/2006">
+        <mc:Choice xmlns:a14="http://schemas.microsoft.com/office/drawing/2010/main" Requires="a14">
+          <p:sp>
+            <p:nvSpPr>
+              <p:cNvPr id="15" name="CasellaDiTesto 14">
+                <a:extLst>
+                  <a:ext uri="{FF2B5EF4-FFF2-40B4-BE49-F238E27FC236}">
+                    <a16:creationId xmlns:a16="http://schemas.microsoft.com/office/drawing/2014/main" id="{0E11C606-8F48-4422-8E2B-D90C38B91667}"/>
+                  </a:ext>
+                </a:extLst>
+              </p:cNvPr>
+              <p:cNvSpPr txBox="1"/>
+              <p:nvPr/>
+            </p:nvSpPr>
+            <p:spPr>
+              <a:xfrm>
+                <a:off x="-8326" y="1155171"/>
+                <a:ext cx="4086989" cy="2031325"/>
+              </a:xfrm>
+              <a:prstGeom prst="rect">
+                <a:avLst/>
+              </a:prstGeom>
+              <a:noFill/>
+            </p:spPr>
+            <p:txBody>
+              <a:bodyPr wrap="square" rtlCol="0">
+                <a:spAutoFit/>
+              </a:bodyPr>
+              <a:lstStyle/>
+              <a:p>
+                <a:r>
+                  <a:rPr lang="it-IT" sz="1400" dirty="0">
+                    <a:latin typeface="Arial" panose="020B0604020202020204" pitchFamily="34" charset="0"/>
+                    <a:cs typeface="Arial" panose="020B0604020202020204" pitchFamily="34" charset="0"/>
+                  </a:rPr>
+                  <a:t>Proprietà dell’albero:</a:t>
+                </a:r>
+              </a:p>
+              <a:p>
+                <a:pPr marL="285750" indent="-285750">
+                  <a:buFont typeface="Arial" panose="020B0604020202020204" pitchFamily="34" charset="0"/>
+                  <a:buChar char="•"/>
+                </a:pPr>
+                <a:r>
+                  <a:rPr lang="it-IT" sz="1400" dirty="0">
+                    <a:latin typeface="Arial" panose="020B0604020202020204" pitchFamily="34" charset="0"/>
+                    <a:cs typeface="Arial" panose="020B0604020202020204" pitchFamily="34" charset="0"/>
+                  </a:rPr>
+                  <a:t>Numero non negativo su ogni arco rappresenta la distanza tra le foglie;</a:t>
+                </a:r>
+              </a:p>
+              <a:p>
+                <a:pPr marL="285750" indent="-285750">
+                  <a:buFont typeface="Arial" panose="020B0604020202020204" pitchFamily="34" charset="0"/>
+                  <a:buChar char="•"/>
+                </a:pPr>
+                <a:r>
+                  <a:rPr lang="it-IT" sz="1400" i="1" dirty="0">
+                    <a:latin typeface="Arial" panose="020B0604020202020204" pitchFamily="34" charset="0"/>
+                    <a:cs typeface="Arial" panose="020B0604020202020204" pitchFamily="34" charset="0"/>
+                  </a:rPr>
+                  <a:t>Distanza evolutiva </a:t>
+                </a:r>
+                <a:r>
+                  <a:rPr lang="it-IT" sz="1400" dirty="0">
+                    <a:latin typeface="Arial" panose="020B0604020202020204" pitchFamily="34" charset="0"/>
+                    <a:cs typeface="Arial" panose="020B0604020202020204" pitchFamily="34" charset="0"/>
+                  </a:rPr>
+                  <a:t>tra due entità biologiche </a:t>
+                </a:r>
+                <a14:m>
+                  <m:oMath xmlns:m="http://schemas.openxmlformats.org/officeDocument/2006/math">
+                    <m:r>
+                      <a:rPr lang="it-IT" sz="1400" b="0" i="1" smtClean="0">
+                        <a:latin typeface="Cambria Math" panose="02040503050406030204" pitchFamily="18" charset="0"/>
+                        <a:cs typeface="Arial" panose="020B0604020202020204" pitchFamily="34" charset="0"/>
+                      </a:rPr>
+                      <m:t>𝑖</m:t>
+                    </m:r>
+                  </m:oMath>
+                </a14:m>
+                <a:r>
+                  <a:rPr lang="it-IT" sz="1400" dirty="0">
+                    <a:latin typeface="Arial" panose="020B0604020202020204" pitchFamily="34" charset="0"/>
+                    <a:cs typeface="Arial" panose="020B0604020202020204" pitchFamily="34" charset="0"/>
+                  </a:rPr>
+                  <a:t> e </a:t>
+                </a:r>
+                <a14:m>
+                  <m:oMath xmlns:m="http://schemas.openxmlformats.org/officeDocument/2006/math">
+                    <m:r>
+                      <a:rPr lang="it-IT" sz="1400" b="0" i="1" smtClean="0">
+                        <a:latin typeface="Cambria Math" panose="02040503050406030204" pitchFamily="18" charset="0"/>
+                        <a:cs typeface="Arial" panose="020B0604020202020204" pitchFamily="34" charset="0"/>
+                      </a:rPr>
+                      <m:t>𝑗</m:t>
+                    </m:r>
+                  </m:oMath>
+                </a14:m>
+                <a:r>
+                  <a:rPr lang="it-IT" sz="1400" dirty="0">
+                    <a:latin typeface="Arial" panose="020B0604020202020204" pitchFamily="34" charset="0"/>
+                    <a:cs typeface="Arial" panose="020B0604020202020204" pitchFamily="34" charset="0"/>
+                    <a:sym typeface="Wingdings" panose="05000000000000000000" pitchFamily="2" charset="2"/>
+                  </a:rPr>
+                  <a:t>  somma del peso degli archi che  collegano </a:t>
+                </a:r>
+                <a14:m>
+                  <m:oMath xmlns:m="http://schemas.openxmlformats.org/officeDocument/2006/math">
+                    <m:r>
+                      <a:rPr lang="it-IT" sz="1400" i="1">
+                        <a:latin typeface="Cambria Math" panose="02040503050406030204" pitchFamily="18" charset="0"/>
+                        <a:cs typeface="Arial" panose="020B0604020202020204" pitchFamily="34" charset="0"/>
+                      </a:rPr>
+                      <m:t>𝑖</m:t>
+                    </m:r>
+                  </m:oMath>
+                </a14:m>
+                <a:r>
+                  <a:rPr lang="it-IT" sz="1400" dirty="0">
+                    <a:latin typeface="Arial" panose="020B0604020202020204" pitchFamily="34" charset="0"/>
+                    <a:cs typeface="Arial" panose="020B0604020202020204" pitchFamily="34" charset="0"/>
+                    <a:sym typeface="Wingdings" panose="05000000000000000000" pitchFamily="2" charset="2"/>
+                  </a:rPr>
+                  <a:t> e </a:t>
+                </a:r>
+                <a14:m>
+                  <m:oMath xmlns:m="http://schemas.openxmlformats.org/officeDocument/2006/math">
+                    <m:r>
+                      <a:rPr lang="it-IT" sz="1400" b="0" i="1" smtClean="0">
+                        <a:latin typeface="Cambria Math" panose="02040503050406030204" pitchFamily="18" charset="0"/>
+                        <a:cs typeface="Arial" panose="020B0604020202020204" pitchFamily="34" charset="0"/>
+                      </a:rPr>
+                      <m:t>𝑗</m:t>
+                    </m:r>
+                  </m:oMath>
+                </a14:m>
+                <a:r>
+                  <a:rPr lang="it-IT" sz="1400" dirty="0">
+                    <a:latin typeface="Arial" panose="020B0604020202020204" pitchFamily="34" charset="0"/>
+                    <a:cs typeface="Arial" panose="020B0604020202020204" pitchFamily="34" charset="0"/>
+                    <a:sym typeface="Wingdings" panose="05000000000000000000" pitchFamily="2" charset="2"/>
+                  </a:rPr>
+                  <a:t>;</a:t>
+                </a:r>
+              </a:p>
+              <a:p>
+                <a:pPr marL="285750" indent="-285750">
+                  <a:buFont typeface="Arial" panose="020B0604020202020204" pitchFamily="34" charset="0"/>
+                  <a:buChar char="•"/>
+                </a:pPr>
+                <a:r>
+                  <a:rPr lang="it-IT" sz="1400" dirty="0">
+                    <a:latin typeface="Arial" panose="020B0604020202020204" pitchFamily="34" charset="0"/>
+                    <a:cs typeface="Arial" panose="020B0604020202020204" pitchFamily="34" charset="0"/>
+                    <a:sym typeface="Wingdings" panose="05000000000000000000" pitchFamily="2" charset="2"/>
+                  </a:rPr>
+                  <a:t>Tutti i vertici hanno grado diverso da 2  </a:t>
+                </a:r>
+                <a:r>
+                  <a:rPr lang="it-IT" sz="1400" i="1" dirty="0">
+                    <a:latin typeface="Arial" panose="020B0604020202020204" pitchFamily="34" charset="0"/>
+                    <a:cs typeface="Arial" panose="020B0604020202020204" pitchFamily="34" charset="0"/>
+                    <a:sym typeface="Wingdings" panose="05000000000000000000" pitchFamily="2" charset="2"/>
+                  </a:rPr>
+                  <a:t>Albero semplice</a:t>
+                </a:r>
+                <a:r>
+                  <a:rPr lang="it-IT" sz="1400" dirty="0">
+                    <a:latin typeface="Arial" panose="020B0604020202020204" pitchFamily="34" charset="0"/>
+                    <a:cs typeface="Arial" panose="020B0604020202020204" pitchFamily="34" charset="0"/>
+                    <a:sym typeface="Wingdings" panose="05000000000000000000" pitchFamily="2" charset="2"/>
+                  </a:rPr>
+                  <a:t>;</a:t>
+                </a:r>
+              </a:p>
+              <a:p>
+                <a:pPr marL="285750" indent="-285750">
+                  <a:buFont typeface="Arial" panose="020B0604020202020204" pitchFamily="34" charset="0"/>
+                  <a:buChar char="•"/>
+                </a:pPr>
+                <a:r>
+                  <a:rPr lang="it-IT" sz="1400" dirty="0">
+                    <a:latin typeface="Arial" panose="020B0604020202020204" pitchFamily="34" charset="0"/>
+                    <a:cs typeface="Arial" panose="020B0604020202020204" pitchFamily="34" charset="0"/>
+                  </a:rPr>
+                  <a:t>L’albero si </a:t>
+                </a:r>
+                <a:r>
+                  <a:rPr lang="it-IT" sz="1400" i="1" dirty="0">
+                    <a:latin typeface="Arial" panose="020B0604020202020204" pitchFamily="34" charset="0"/>
+                    <a:cs typeface="Arial" panose="020B0604020202020204" pitchFamily="34" charset="0"/>
+                  </a:rPr>
+                  <a:t>adatta</a:t>
+                </a:r>
+                <a:r>
+                  <a:rPr lang="it-IT" sz="1400" dirty="0">
+                    <a:latin typeface="Arial" panose="020B0604020202020204" pitchFamily="34" charset="0"/>
+                    <a:cs typeface="Arial" panose="020B0604020202020204" pitchFamily="34" charset="0"/>
+                  </a:rPr>
+                  <a:t> alla matrice D.</a:t>
+                </a:r>
+              </a:p>
+            </p:txBody>
+          </p:sp>
+        </mc:Choice>
+        <mc:Fallback>
+          <p:sp>
+            <p:nvSpPr>
+              <p:cNvPr id="15" name="CasellaDiTesto 14">
+                <a:extLst>
+                  <a:ext uri="{FF2B5EF4-FFF2-40B4-BE49-F238E27FC236}">
+                    <a16:creationId xmlns:a16="http://schemas.microsoft.com/office/drawing/2014/main" id="{0E11C606-8F48-4422-8E2B-D90C38B91667}"/>
+                  </a:ext>
+                </a:extLst>
+              </p:cNvPr>
+              <p:cNvSpPr txBox="1">
+                <a:spLocks noRot="1" noChangeAspect="1" noMove="1" noResize="1" noEditPoints="1" noAdjustHandles="1" noChangeArrowheads="1" noChangeShapeType="1" noTextEdit="1"/>
+              </p:cNvSpPr>
+              <p:nvPr/>
+            </p:nvSpPr>
+            <p:spPr>
+              <a:xfrm>
+                <a:off x="-8326" y="1155171"/>
+                <a:ext cx="4086989" cy="2031325"/>
+              </a:xfrm>
+              <a:prstGeom prst="rect">
+                <a:avLst/>
+              </a:prstGeom>
+              <a:blipFill>
+                <a:blip r:embed="rId6"/>
+                <a:stretch>
+                  <a:fillRect l="-448" t="-299" b="-2096"/>
+                </a:stretch>
+              </a:blipFill>
+            </p:spPr>
+            <p:txBody>
+              <a:bodyPr/>
+              <a:lstStyle/>
+              <a:p>
+                <a:r>
+                  <a:rPr lang="it-IT">
+                    <a:noFill/>
+                  </a:rPr>
+                  <a:t> </a:t>
+                </a:r>
+              </a:p>
+            </p:txBody>
+          </p:sp>
+        </mc:Fallback>
+      </mc:AlternateContent>
+      <mc:AlternateContent xmlns:mc="http://schemas.openxmlformats.org/markup-compatibility/2006">
+        <mc:Choice xmlns:a14="http://schemas.microsoft.com/office/drawing/2010/main" Requires="a14">
+          <p:sp>
+            <p:nvSpPr>
+              <p:cNvPr id="16" name="CasellaDiTesto 15">
+                <a:extLst>
+                  <a:ext uri="{FF2B5EF4-FFF2-40B4-BE49-F238E27FC236}">
+                    <a16:creationId xmlns:a16="http://schemas.microsoft.com/office/drawing/2014/main" id="{FF76A307-4A6F-4E91-B391-23862C1AEDD3}"/>
+                  </a:ext>
+                </a:extLst>
+              </p:cNvPr>
+              <p:cNvSpPr txBox="1"/>
+              <p:nvPr/>
+            </p:nvSpPr>
+            <p:spPr>
+              <a:xfrm>
+                <a:off x="144074" y="3558938"/>
+                <a:ext cx="4623235" cy="307777"/>
+              </a:xfrm>
+              <a:prstGeom prst="rect">
+                <a:avLst/>
+              </a:prstGeom>
+              <a:noFill/>
+            </p:spPr>
+            <p:txBody>
+              <a:bodyPr wrap="square" rtlCol="0">
+                <a:spAutoFit/>
+              </a:bodyPr>
+              <a:lstStyle/>
+              <a:p>
+                <a:r>
+                  <a:rPr lang="it-IT" sz="1400" b="0" dirty="0">
+                    <a:latin typeface="Arial" panose="020B0604020202020204" pitchFamily="34" charset="0"/>
+                    <a:cs typeface="Arial" panose="020B0604020202020204" pitchFamily="34" charset="0"/>
+                  </a:rPr>
+                  <a:t>Un albero </a:t>
+                </a:r>
+                <a14:m>
+                  <m:oMath xmlns:m="http://schemas.openxmlformats.org/officeDocument/2006/math">
+                    <m:r>
+                      <a:rPr lang="it-IT" sz="1400" i="1">
+                        <a:latin typeface="Cambria Math" panose="02040503050406030204" pitchFamily="18" charset="0"/>
+                        <a:cs typeface="Arial" panose="020B0604020202020204" pitchFamily="34" charset="0"/>
+                      </a:rPr>
+                      <m:t>𝑇</m:t>
+                    </m:r>
+                  </m:oMath>
+                </a14:m>
+                <a:r>
+                  <a:rPr lang="it-IT" sz="1400" dirty="0">
+                    <a:latin typeface="Arial" panose="020B0604020202020204" pitchFamily="34" charset="0"/>
+                    <a:cs typeface="Arial" panose="020B0604020202020204" pitchFamily="34" charset="0"/>
+                  </a:rPr>
+                  <a:t> si </a:t>
+                </a:r>
+                <a:r>
+                  <a:rPr lang="it-IT" sz="1400" i="1" dirty="0">
+                    <a:latin typeface="Arial" panose="020B0604020202020204" pitchFamily="34" charset="0"/>
+                    <a:cs typeface="Arial" panose="020B0604020202020204" pitchFamily="34" charset="0"/>
+                  </a:rPr>
+                  <a:t>adatta</a:t>
+                </a:r>
+                <a:r>
+                  <a:rPr lang="it-IT" sz="1400" dirty="0">
+                    <a:latin typeface="Arial" panose="020B0604020202020204" pitchFamily="34" charset="0"/>
+                    <a:cs typeface="Arial" panose="020B0604020202020204" pitchFamily="34" charset="0"/>
+                  </a:rPr>
+                  <a:t> ad una matrice delle distanze </a:t>
+                </a:r>
+                <a14:m>
+                  <m:oMath xmlns:m="http://schemas.openxmlformats.org/officeDocument/2006/math">
+                    <m:r>
+                      <a:rPr lang="it-IT" sz="1400" b="0" i="1" smtClean="0">
+                        <a:latin typeface="Cambria Math" panose="02040503050406030204" pitchFamily="18" charset="0"/>
+                        <a:cs typeface="Arial" panose="020B0604020202020204" pitchFamily="34" charset="0"/>
+                      </a:rPr>
+                      <m:t>𝐷</m:t>
+                    </m:r>
+                  </m:oMath>
+                </a14:m>
+                <a:r>
+                  <a:rPr lang="it-IT" sz="1400" dirty="0">
+                    <a:latin typeface="Arial" panose="020B0604020202020204" pitchFamily="34" charset="0"/>
+                    <a:cs typeface="Arial" panose="020B0604020202020204" pitchFamily="34" charset="0"/>
+                  </a:rPr>
+                  <a:t> se </a:t>
+                </a:r>
+              </a:p>
+            </p:txBody>
+          </p:sp>
+        </mc:Choice>
+        <mc:Fallback>
+          <p:sp>
+            <p:nvSpPr>
+              <p:cNvPr id="16" name="CasellaDiTesto 15">
+                <a:extLst>
+                  <a:ext uri="{FF2B5EF4-FFF2-40B4-BE49-F238E27FC236}">
+                    <a16:creationId xmlns:a16="http://schemas.microsoft.com/office/drawing/2014/main" id="{FF76A307-4A6F-4E91-B391-23862C1AEDD3}"/>
+                  </a:ext>
+                </a:extLst>
+              </p:cNvPr>
+              <p:cNvSpPr txBox="1">
+                <a:spLocks noRot="1" noChangeAspect="1" noMove="1" noResize="1" noEditPoints="1" noAdjustHandles="1" noChangeArrowheads="1" noChangeShapeType="1" noTextEdit="1"/>
+              </p:cNvSpPr>
+              <p:nvPr/>
+            </p:nvSpPr>
+            <p:spPr>
+              <a:xfrm>
+                <a:off x="144074" y="3558938"/>
+                <a:ext cx="4623235" cy="307777"/>
+              </a:xfrm>
+              <a:prstGeom prst="rect">
+                <a:avLst/>
+              </a:prstGeom>
+              <a:blipFill>
+                <a:blip r:embed="rId7"/>
+                <a:stretch>
+                  <a:fillRect l="-396" t="-4000" r="-923" b="-20000"/>
+                </a:stretch>
+              </a:blipFill>
+            </p:spPr>
+            <p:txBody>
+              <a:bodyPr/>
+              <a:lstStyle/>
+              <a:p>
+                <a:r>
+                  <a:rPr lang="it-IT">
+                    <a:noFill/>
+                  </a:rPr>
+                  <a:t> </a:t>
+                </a:r>
+              </a:p>
+            </p:txBody>
+          </p:sp>
+        </mc:Fallback>
+      </mc:AlternateContent>
+      <p:pic>
+        <p:nvPicPr>
+          <p:cNvPr id="8" name="Immagine 7">
+            <a:extLst>
+              <a:ext uri="{FF2B5EF4-FFF2-40B4-BE49-F238E27FC236}">
+                <a16:creationId xmlns:a16="http://schemas.microsoft.com/office/drawing/2014/main" id="{549817D7-5005-47AE-B9FB-AC85E56E5176}"/>
+              </a:ext>
+            </a:extLst>
+          </p:cNvPr>
+          <p:cNvPicPr>
+            <a:picLocks noChangeAspect="1"/>
+          </p:cNvPicPr>
+          <p:nvPr>
+            <p:custDataLst>
+              <p:tags r:id="rId1"/>
+            </p:custDataLst>
+          </p:nvPr>
+        </p:nvPicPr>
+        <p:blipFill>
+          <a:blip r:embed="rId8"/>
+          <a:stretch>
+            <a:fillRect/>
+          </a:stretch>
+        </p:blipFill>
+        <p:spPr>
+          <a:xfrm>
+            <a:off x="5257690" y="3601003"/>
+            <a:ext cx="2106197" cy="229623"/>
+          </a:xfrm>
+          <a:prstGeom prst="rect">
+            <a:avLst/>
+          </a:prstGeom>
+        </p:spPr>
+      </p:pic>
+      <p:cxnSp>
+        <p:nvCxnSpPr>
+          <p:cNvPr id="17" name="Connettore 2 16">
+            <a:extLst>
+              <a:ext uri="{FF2B5EF4-FFF2-40B4-BE49-F238E27FC236}">
+                <a16:creationId xmlns:a16="http://schemas.microsoft.com/office/drawing/2014/main" id="{F3FA35E4-BA94-4E6F-9AE3-C36899E2535D}"/>
+              </a:ext>
+            </a:extLst>
+          </p:cNvPr>
+          <p:cNvCxnSpPr>
+            <a:cxnSpLocks/>
+            <a:stCxn id="16" idx="3"/>
+          </p:cNvCxnSpPr>
+          <p:nvPr/>
+        </p:nvCxnSpPr>
+        <p:spPr>
+          <a:xfrm>
+            <a:off x="4767309" y="3712827"/>
+            <a:ext cx="417250" cy="0"/>
+          </a:xfrm>
+          <a:prstGeom prst="straightConnector1">
+            <a:avLst/>
+          </a:prstGeom>
+          <a:ln>
+            <a:tailEnd type="triangle"/>
+          </a:ln>
+        </p:spPr>
+        <p:style>
+          <a:lnRef idx="2">
+            <a:schemeClr val="accent1"/>
+          </a:lnRef>
+          <a:fillRef idx="0">
+            <a:schemeClr val="accent1"/>
+          </a:fillRef>
+          <a:effectRef idx="1">
+            <a:schemeClr val="accent1"/>
+          </a:effectRef>
+          <a:fontRef idx="minor">
+            <a:schemeClr val="tx1"/>
+          </a:fontRef>
+        </p:style>
+      </p:cxnSp>
+      <mc:AlternateContent xmlns:mc="http://schemas.openxmlformats.org/markup-compatibility/2006">
+        <mc:Choice xmlns:a14="http://schemas.microsoft.com/office/drawing/2010/main" Requires="a14">
+          <p:sp>
+            <p:nvSpPr>
+              <p:cNvPr id="21" name="CasellaDiTesto 20">
+                <a:extLst>
+                  <a:ext uri="{FF2B5EF4-FFF2-40B4-BE49-F238E27FC236}">
+                    <a16:creationId xmlns:a16="http://schemas.microsoft.com/office/drawing/2014/main" id="{0A1A6099-3212-4698-B7DB-16A2F15F788E}"/>
+                  </a:ext>
+                </a:extLst>
+              </p:cNvPr>
+              <p:cNvSpPr txBox="1"/>
+              <p:nvPr/>
+            </p:nvSpPr>
+            <p:spPr>
+              <a:xfrm>
+                <a:off x="1228804" y="4009079"/>
+                <a:ext cx="5699718" cy="307777"/>
+              </a:xfrm>
+              <a:prstGeom prst="rect">
+                <a:avLst/>
+              </a:prstGeom>
+              <a:noFill/>
+            </p:spPr>
+            <p:txBody>
+              <a:bodyPr wrap="square" rtlCol="0">
+                <a:spAutoFit/>
+              </a:bodyPr>
+              <a:lstStyle/>
+              <a:p>
+                <a:r>
+                  <a:rPr lang="it-IT" sz="1400" b="0" dirty="0">
+                    <a:latin typeface="Arial" panose="020B0604020202020204" pitchFamily="34" charset="0"/>
+                    <a:cs typeface="Arial" panose="020B0604020202020204" pitchFamily="34" charset="0"/>
+                  </a:rPr>
+                  <a:t>Sia </a:t>
+                </a:r>
+                <a14:m>
+                  <m:oMath xmlns:m="http://schemas.openxmlformats.org/officeDocument/2006/math">
+                    <m:r>
+                      <a:rPr lang="it-IT" sz="1400" i="1">
+                        <a:latin typeface="Cambria Math" panose="02040503050406030204" pitchFamily="18" charset="0"/>
+                        <a:cs typeface="Arial" panose="020B0604020202020204" pitchFamily="34" charset="0"/>
+                      </a:rPr>
+                      <m:t>𝑇</m:t>
+                    </m:r>
+                  </m:oMath>
+                </a14:m>
+                <a:r>
+                  <a:rPr lang="it-IT" sz="1400" dirty="0">
+                    <a:latin typeface="Arial" panose="020B0604020202020204" pitchFamily="34" charset="0"/>
+                    <a:cs typeface="Arial" panose="020B0604020202020204" pitchFamily="34" charset="0"/>
+                  </a:rPr>
+                  <a:t> che </a:t>
+                </a:r>
+                <a14:m>
+                  <m:oMath xmlns:m="http://schemas.openxmlformats.org/officeDocument/2006/math">
+                    <m:r>
+                      <a:rPr lang="it-IT" sz="1400" b="0" i="1" smtClean="0">
+                        <a:latin typeface="Cambria Math" panose="02040503050406030204" pitchFamily="18" charset="0"/>
+                        <a:cs typeface="Arial" panose="020B0604020202020204" pitchFamily="34" charset="0"/>
+                      </a:rPr>
+                      <m:t>𝐷</m:t>
+                    </m:r>
+                  </m:oMath>
+                </a14:m>
+                <a:r>
+                  <a:rPr lang="it-IT" sz="1400" dirty="0">
+                    <a:latin typeface="Arial" panose="020B0604020202020204" pitchFamily="34" charset="0"/>
+                    <a:cs typeface="Arial" panose="020B0604020202020204" pitchFamily="34" charset="0"/>
+                  </a:rPr>
+                  <a:t> si definiscono </a:t>
+                </a:r>
+                <a:r>
+                  <a:rPr lang="it-IT" sz="1400" i="1" dirty="0">
+                    <a:latin typeface="Arial" panose="020B0604020202020204" pitchFamily="34" charset="0"/>
+                    <a:cs typeface="Arial" panose="020B0604020202020204" pitchFamily="34" charset="0"/>
+                  </a:rPr>
+                  <a:t>additivi</a:t>
+                </a:r>
+                <a:r>
+                  <a:rPr lang="it-IT" sz="1400" dirty="0">
+                    <a:latin typeface="Arial" panose="020B0604020202020204" pitchFamily="34" charset="0"/>
+                    <a:cs typeface="Arial" panose="020B0604020202020204" pitchFamily="34" charset="0"/>
+                  </a:rPr>
+                  <a:t>, altrimenti si parla di </a:t>
+                </a:r>
+                <a:r>
+                  <a:rPr lang="it-IT" sz="1400" i="1" dirty="0">
+                    <a:latin typeface="Arial" panose="020B0604020202020204" pitchFamily="34" charset="0"/>
+                    <a:cs typeface="Arial" panose="020B0604020202020204" pitchFamily="34" charset="0"/>
+                  </a:rPr>
+                  <a:t>non additività</a:t>
+                </a:r>
+                <a:r>
+                  <a:rPr lang="it-IT" sz="1400" dirty="0">
+                    <a:latin typeface="Arial" panose="020B0604020202020204" pitchFamily="34" charset="0"/>
+                    <a:cs typeface="Arial" panose="020B0604020202020204" pitchFamily="34" charset="0"/>
+                  </a:rPr>
+                  <a:t>. </a:t>
+                </a:r>
+              </a:p>
+            </p:txBody>
+          </p:sp>
+        </mc:Choice>
+        <mc:Fallback>
+          <p:sp>
+            <p:nvSpPr>
+              <p:cNvPr id="21" name="CasellaDiTesto 20">
+                <a:extLst>
+                  <a:ext uri="{FF2B5EF4-FFF2-40B4-BE49-F238E27FC236}">
+                    <a16:creationId xmlns:a16="http://schemas.microsoft.com/office/drawing/2014/main" id="{0A1A6099-3212-4698-B7DB-16A2F15F788E}"/>
+                  </a:ext>
+                </a:extLst>
+              </p:cNvPr>
+              <p:cNvSpPr txBox="1">
+                <a:spLocks noRot="1" noChangeAspect="1" noMove="1" noResize="1" noEditPoints="1" noAdjustHandles="1" noChangeArrowheads="1" noChangeShapeType="1" noTextEdit="1"/>
+              </p:cNvSpPr>
+              <p:nvPr/>
+            </p:nvSpPr>
+            <p:spPr>
+              <a:xfrm>
+                <a:off x="1228804" y="4009079"/>
+                <a:ext cx="5699718" cy="307777"/>
+              </a:xfrm>
+              <a:prstGeom prst="rect">
+                <a:avLst/>
+              </a:prstGeom>
+              <a:blipFill>
+                <a:blip r:embed="rId9"/>
+                <a:stretch>
+                  <a:fillRect l="-321" t="-4000" b="-20000"/>
+                </a:stretch>
+              </a:blipFill>
+            </p:spPr>
+            <p:txBody>
+              <a:bodyPr/>
+              <a:lstStyle/>
+              <a:p>
+                <a:r>
+                  <a:rPr lang="it-IT">
+                    <a:noFill/>
+                  </a:rPr>
+                  <a:t> </a:t>
+                </a:r>
+              </a:p>
+            </p:txBody>
+          </p:sp>
+        </mc:Fallback>
+      </mc:AlternateContent>
+      <p:sp>
+        <p:nvSpPr>
+          <p:cNvPr id="22" name="CasellaDiTesto 21">
+            <a:extLst>
+              <a:ext uri="{FF2B5EF4-FFF2-40B4-BE49-F238E27FC236}">
+                <a16:creationId xmlns:a16="http://schemas.microsoft.com/office/drawing/2014/main" id="{0D76B533-3BF2-4167-8DD3-38BA2D7261DA}"/>
               </a:ext>
             </a:extLst>
           </p:cNvPr>
@@ -7776,8 +8475,8 @@
         </p:nvSpPr>
         <p:spPr>
           <a:xfrm>
-            <a:off x="-8326" y="1155171"/>
-            <a:ext cx="9152326" cy="738664"/>
+            <a:off x="144074" y="4631822"/>
+            <a:ext cx="5699718" cy="307777"/>
           </a:xfrm>
           <a:prstGeom prst="rect">
             <a:avLst/>
@@ -7791,56 +8490,176 @@
           <a:lstStyle/>
           <a:p>
             <a:r>
-              <a:rPr lang="it-IT" sz="1400" dirty="0">
+              <a:rPr lang="it-IT" sz="1400" b="1" dirty="0">
                 <a:latin typeface="Arial" panose="020B0604020202020204" pitchFamily="34" charset="0"/>
                 <a:cs typeface="Arial" panose="020B0604020202020204" pitchFamily="34" charset="0"/>
               </a:rPr>
-              <a:t>Gli algoritmi utilizzati per la costruzione degli alberi evolutivi prendono il nome di </a:t>
-            </a:r>
-            <a:r>
-              <a:rPr lang="it-IT" sz="1400" i="1" dirty="0">
-                <a:latin typeface="Arial" panose="020B0604020202020204" pitchFamily="34" charset="0"/>
-                <a:cs typeface="Arial" panose="020B0604020202020204" pitchFamily="34" charset="0"/>
-              </a:rPr>
-              <a:t>algoritmi basati sulla distanza</a:t>
-            </a:r>
-            <a:r>
-              <a:rPr lang="it-IT" sz="1400" dirty="0">
-                <a:latin typeface="Arial" panose="020B0604020202020204" pitchFamily="34" charset="0"/>
-                <a:cs typeface="Arial" panose="020B0604020202020204" pitchFamily="34" charset="0"/>
-              </a:rPr>
-              <a:t>, in quanto prendono in input una </a:t>
-            </a:r>
-            <a:r>
-              <a:rPr lang="it-IT" sz="1400" i="1" dirty="0">
-                <a:latin typeface="Arial" panose="020B0604020202020204" pitchFamily="34" charset="0"/>
-                <a:cs typeface="Arial" panose="020B0604020202020204" pitchFamily="34" charset="0"/>
-              </a:rPr>
-              <a:t>matrice delle distanze</a:t>
-            </a:r>
-            <a:r>
-              <a:rPr lang="it-IT" sz="1400" dirty="0">
-                <a:latin typeface="Arial" panose="020B0604020202020204" pitchFamily="34" charset="0"/>
-                <a:cs typeface="Arial" panose="020B0604020202020204" pitchFamily="34" charset="0"/>
-              </a:rPr>
-              <a:t>.</a:t>
-            </a:r>
-            <a:br>
-              <a:rPr lang="it-IT" sz="1400" dirty="0">
-                <a:latin typeface="Arial" panose="020B0604020202020204" pitchFamily="34" charset="0"/>
-                <a:cs typeface="Arial" panose="020B0604020202020204" pitchFamily="34" charset="0"/>
-              </a:rPr>
-            </a:br>
-            <a:r>
-              <a:rPr lang="it-IT" sz="1400" dirty="0">
-                <a:latin typeface="Arial" panose="020B0604020202020204" pitchFamily="34" charset="0"/>
-                <a:cs typeface="Arial" panose="020B0604020202020204" pitchFamily="34" charset="0"/>
-              </a:rPr>
-              <a:t>TODO COSTRUIRE MATRICE DELLE DISTANZE</a:t>
-            </a:r>
-          </a:p>
-        </p:txBody>
-      </p:sp>
+              <a:t>Problema degli alberi basati sulla distanza:</a:t>
+            </a:r>
+          </a:p>
+        </p:txBody>
+      </p:sp>
+      <p:sp>
+        <p:nvSpPr>
+          <p:cNvPr id="23" name="CasellaDiTesto 22">
+            <a:extLst>
+              <a:ext uri="{FF2B5EF4-FFF2-40B4-BE49-F238E27FC236}">
+                <a16:creationId xmlns:a16="http://schemas.microsoft.com/office/drawing/2014/main" id="{DE101B46-F7FB-4E5F-9EF6-11355486EE87}"/>
+              </a:ext>
+            </a:extLst>
+          </p:cNvPr>
+          <p:cNvSpPr txBox="1"/>
+          <p:nvPr/>
+        </p:nvSpPr>
+        <p:spPr>
+          <a:xfrm>
+            <a:off x="144074" y="4992207"/>
+            <a:ext cx="7264201" cy="307777"/>
+          </a:xfrm>
+          <a:prstGeom prst="rect">
+            <a:avLst/>
+          </a:prstGeom>
+          <a:noFill/>
+        </p:spPr>
+        <p:txBody>
+          <a:bodyPr wrap="square" rtlCol="0">
+            <a:spAutoFit/>
+          </a:bodyPr>
+          <a:lstStyle/>
+          <a:p>
+            <a:r>
+              <a:rPr lang="it-IT" sz="1400" i="1" dirty="0"/>
+              <a:t>Data in </a:t>
+            </a:r>
+            <a:r>
+              <a:rPr lang="it-IT" sz="1400" b="1" i="1" dirty="0"/>
+              <a:t>input</a:t>
+            </a:r>
+            <a:r>
+              <a:rPr lang="it-IT" sz="1400" i="1" dirty="0"/>
+              <a:t> una matrice delle distanze additiva restituire in </a:t>
+            </a:r>
+            <a:r>
+              <a:rPr lang="it-IT" sz="1400" b="1" i="1" dirty="0"/>
+              <a:t>output</a:t>
+            </a:r>
+            <a:r>
+              <a:rPr lang="it-IT" sz="1400" i="1" dirty="0"/>
+              <a:t> un albero evolutivo semplice.</a:t>
+            </a:r>
+            <a:endParaRPr lang="it-IT" sz="1400" dirty="0"/>
+          </a:p>
+        </p:txBody>
+      </p:sp>
+      <p:sp>
+        <p:nvSpPr>
+          <p:cNvPr id="24" name="CasellaDiTesto 23">
+            <a:extLst>
+              <a:ext uri="{FF2B5EF4-FFF2-40B4-BE49-F238E27FC236}">
+                <a16:creationId xmlns:a16="http://schemas.microsoft.com/office/drawing/2014/main" id="{B07339FC-3734-4F7D-B1AD-9755149806CA}"/>
+              </a:ext>
+            </a:extLst>
+          </p:cNvPr>
+          <p:cNvSpPr txBox="1"/>
+          <p:nvPr/>
+        </p:nvSpPr>
+        <p:spPr>
+          <a:xfrm>
+            <a:off x="261451" y="5720981"/>
+            <a:ext cx="3467170" cy="307777"/>
+          </a:xfrm>
+          <a:prstGeom prst="rect">
+            <a:avLst/>
+          </a:prstGeom>
+          <a:noFill/>
+        </p:spPr>
+        <p:txBody>
+          <a:bodyPr wrap="square" rtlCol="0">
+            <a:spAutoFit/>
+          </a:bodyPr>
+          <a:lstStyle/>
+          <a:p>
+            <a:r>
+              <a:rPr lang="it-IT" sz="1400" dirty="0"/>
+              <a:t>Obiettivo degli algoritmi basati sulla distanza</a:t>
+            </a:r>
+          </a:p>
+        </p:txBody>
+      </p:sp>
+      <p:sp>
+        <p:nvSpPr>
+          <p:cNvPr id="25" name="CasellaDiTesto 24">
+            <a:extLst>
+              <a:ext uri="{FF2B5EF4-FFF2-40B4-BE49-F238E27FC236}">
+                <a16:creationId xmlns:a16="http://schemas.microsoft.com/office/drawing/2014/main" id="{B5830A77-FBA3-415E-9424-BC44548BE865}"/>
+              </a:ext>
+            </a:extLst>
+          </p:cNvPr>
+          <p:cNvSpPr txBox="1"/>
+          <p:nvPr/>
+        </p:nvSpPr>
+        <p:spPr>
+          <a:xfrm>
+            <a:off x="4838331" y="5722587"/>
+            <a:ext cx="4044218" cy="307777"/>
+          </a:xfrm>
+          <a:prstGeom prst="rect">
+            <a:avLst/>
+          </a:prstGeom>
+          <a:noFill/>
+        </p:spPr>
+        <p:txBody>
+          <a:bodyPr wrap="square" rtlCol="0">
+            <a:spAutoFit/>
+          </a:bodyPr>
+          <a:lstStyle/>
+          <a:p>
+            <a:r>
+              <a:rPr lang="it-IT" sz="1400" dirty="0"/>
+              <a:t>Risolvere il problema degli alberi basati sulla distanza</a:t>
+            </a:r>
+          </a:p>
+        </p:txBody>
+      </p:sp>
+      <p:cxnSp>
+        <p:nvCxnSpPr>
+          <p:cNvPr id="26" name="Connettore 2 25">
+            <a:extLst>
+              <a:ext uri="{FF2B5EF4-FFF2-40B4-BE49-F238E27FC236}">
+                <a16:creationId xmlns:a16="http://schemas.microsoft.com/office/drawing/2014/main" id="{2A43E591-7FF9-4F44-848E-B0D24B008D56}"/>
+              </a:ext>
+            </a:extLst>
+          </p:cNvPr>
+          <p:cNvCxnSpPr/>
+          <p:nvPr/>
+        </p:nvCxnSpPr>
+        <p:spPr>
+          <a:xfrm>
+            <a:off x="3736946" y="5877017"/>
+            <a:ext cx="1030363" cy="0"/>
+          </a:xfrm>
+          <a:prstGeom prst="straightConnector1">
+            <a:avLst/>
+          </a:prstGeom>
+          <a:ln>
+            <a:tailEnd type="triangle"/>
+          </a:ln>
+        </p:spPr>
+        <p:style>
+          <a:lnRef idx="2">
+            <a:schemeClr val="accent1"/>
+          </a:lnRef>
+          <a:fillRef idx="0">
+            <a:schemeClr val="accent1"/>
+          </a:fillRef>
+          <a:effectRef idx="1">
+            <a:schemeClr val="accent1"/>
+          </a:effectRef>
+          <a:fontRef idx="minor">
+            <a:schemeClr val="tx1"/>
+          </a:fontRef>
+        </p:style>
+      </p:cxnSp>
     </p:spTree>
     <p:extLst>
       <p:ext uri="{BB962C8B-B14F-4D97-AF65-F5344CB8AC3E}">
@@ -7919,6 +8738,25 @@
   <p:tag name="LATEXADDIN" val="\documentclass{article}&#10;\usepackage{amsmath}&#10;\pagestyle{empty}&#10;\begin{document}&#10;&#10; \[d(x,y)\leq d(x,z)+d(y,z)\; \forall \: x,y,z\in R^k\]&#10;&#10;&#10;\end{document}"/>
   <p:tag name="IGUANATEXSIZE" val="20"/>
   <p:tag name="IGUANATEXCURSOR" val="110"/>
+  <p:tag name="TRANSPARENCY" val="Vero"/>
+  <p:tag name="FILENAME" val=""/>
+  <p:tag name="LATEXENGINEID" val="0"/>
+  <p:tag name="TEMPFOLDER" val="c:\temp\"/>
+  <p:tag name="LATEXFORMHEIGHT" val="312"/>
+  <p:tag name="LATEXFORMWIDTH" val="384"/>
+  <p:tag name="LATEXFORMWRAP" val="Vero"/>
+  <p:tag name="BITMAPVECTOR" val="0"/>
+</p:tagLst>
+</file>
+
+<file path=ppt/tags/tag5.xml><?xml version="1.0" encoding="utf-8"?>
+<p:tagLst xmlns:a="http://schemas.openxmlformats.org/drawingml/2006/main" xmlns:r="http://schemas.openxmlformats.org/officeDocument/2006/relationships" xmlns:p="http://schemas.openxmlformats.org/presentationml/2006/main">
+  <p:tag name="OUTPUTDPI" val="1200"/>
+  <p:tag name="ORIGINALHEIGHT" val="130,4837"/>
+  <p:tag name="ORIGINALWIDTH" val="1196,85"/>
+  <p:tag name="LATEXADDIN" val="\documentclass{article}&#10;\usepackage{amsmath}&#10;\pagestyle{empty}&#10;\begin{document}&#10;&#10;&#10;$ \forall i,j\in V,D_{ij}=d_{ij}(T)$&#10;&#10;\end{document}"/>
+  <p:tag name="IGUANATEXSIZE" val="14"/>
+  <p:tag name="IGUANATEXCURSOR" val="118"/>
   <p:tag name="TRANSPARENCY" val="Vero"/>
   <p:tag name="FILENAME" val=""/>
   <p:tag name="LATEXENGINEID" val="0"/>

</xml_diff>

<commit_message>
finished slides for neighbor!
</commit_message>
<xml_diff>
--- a/Discussione Laurea/Slides.pptx
+++ b/Discussione Laurea/Slides.pptx
@@ -11074,8 +11074,8 @@
           </a:fontRef>
         </p:style>
       </p:cxnSp>
-      <mc:AlternateContent xmlns:mc="http://schemas.openxmlformats.org/markup-compatibility/2006">
-        <mc:Choice xmlns:a14="http://schemas.microsoft.com/office/drawing/2010/main" Requires="a14">
+      <mc:AlternateContent xmlns:mc="http://schemas.openxmlformats.org/markup-compatibility/2006" xmlns:a14="http://schemas.microsoft.com/office/drawing/2010/main">
+        <mc:Choice Requires="a14">
           <p:sp>
             <p:nvSpPr>
               <p:cNvPr id="15" name="CasellaDiTesto 14">
@@ -11146,7 +11146,7 @@
             </p:txBody>
           </p:sp>
         </mc:Choice>
-        <mc:Fallback>
+        <mc:Fallback xmlns="">
           <p:sp>
             <p:nvSpPr>
               <p:cNvPr id="15" name="CasellaDiTesto 14">
@@ -11362,8 +11362,8 @@
           </a:fontRef>
         </p:style>
       </p:cxnSp>
-      <mc:AlternateContent xmlns:mc="http://schemas.openxmlformats.org/markup-compatibility/2006">
-        <mc:Choice xmlns:a14="http://schemas.microsoft.com/office/drawing/2010/main" Requires="a14">
+      <mc:AlternateContent xmlns:mc="http://schemas.openxmlformats.org/markup-compatibility/2006" xmlns:a14="http://schemas.microsoft.com/office/drawing/2010/main">
+        <mc:Choice Requires="a14">
           <p:sp>
             <p:nvSpPr>
               <p:cNvPr id="23" name="CasellaDiTesto 22">
@@ -11449,7 +11449,7 @@
             </p:txBody>
           </p:sp>
         </mc:Choice>
-        <mc:Fallback>
+        <mc:Fallback xmlns="">
           <p:sp>
             <p:nvSpPr>
               <p:cNvPr id="23" name="CasellaDiTesto 22">
@@ -11979,8 +11979,8 @@
           </a:prstGeom>
         </p:spPr>
       </p:pic>
-      <mc:AlternateContent xmlns:mc="http://schemas.openxmlformats.org/markup-compatibility/2006">
-        <mc:Choice xmlns:a14="http://schemas.microsoft.com/office/drawing/2010/main" Requires="a14">
+      <mc:AlternateContent xmlns:mc="http://schemas.openxmlformats.org/markup-compatibility/2006" xmlns:a14="http://schemas.microsoft.com/office/drawing/2010/main">
+        <mc:Choice Requires="a14">
           <p:sp>
             <p:nvSpPr>
               <p:cNvPr id="25" name="CasellaDiTesto 24">
@@ -12164,7 +12164,7 @@
             </p:txBody>
           </p:sp>
         </mc:Choice>
-        <mc:Fallback>
+        <mc:Fallback xmlns="">
           <p:sp>
             <p:nvSpPr>
               <p:cNvPr id="25" name="CasellaDiTesto 24">
@@ -12284,8 +12284,8 @@
           </a:fontRef>
         </p:style>
       </p:cxnSp>
-      <mc:AlternateContent xmlns:mc="http://schemas.openxmlformats.org/markup-compatibility/2006">
-        <mc:Choice xmlns:a14="http://schemas.microsoft.com/office/drawing/2010/main" Requires="a14">
+      <mc:AlternateContent xmlns:mc="http://schemas.openxmlformats.org/markup-compatibility/2006" xmlns:a14="http://schemas.microsoft.com/office/drawing/2010/main">
+        <mc:Choice Requires="a14">
           <p:sp>
             <p:nvSpPr>
               <p:cNvPr id="31" name="CasellaDiTesto 30">
@@ -12404,7 +12404,7 @@
             </p:txBody>
           </p:sp>
         </mc:Choice>
-        <mc:Fallback>
+        <mc:Fallback xmlns="">
           <p:sp>
             <p:nvSpPr>
               <p:cNvPr id="31" name="CasellaDiTesto 30">
@@ -12601,8 +12601,8 @@
           </a:fontRef>
         </p:style>
       </p:cxnSp>
-      <mc:AlternateContent xmlns:mc="http://schemas.openxmlformats.org/markup-compatibility/2006">
-        <mc:Choice xmlns:a14="http://schemas.microsoft.com/office/drawing/2010/main" Requires="a14">
+      <mc:AlternateContent xmlns:mc="http://schemas.openxmlformats.org/markup-compatibility/2006" xmlns:a14="http://schemas.microsoft.com/office/drawing/2010/main">
+        <mc:Choice Requires="a14">
           <p:sp>
             <p:nvSpPr>
               <p:cNvPr id="46" name="CasellaDiTesto 45">
@@ -12745,7 +12745,7 @@
             </p:txBody>
           </p:sp>
         </mc:Choice>
-        <mc:Fallback>
+        <mc:Fallback xmlns="">
           <p:sp>
             <p:nvSpPr>
               <p:cNvPr id="46" name="CasellaDiTesto 45">
@@ -12824,8 +12824,8 @@
           </a:prstGeom>
         </p:spPr>
       </p:pic>
-      <mc:AlternateContent xmlns:mc="http://schemas.openxmlformats.org/markup-compatibility/2006">
-        <mc:Choice xmlns:a14="http://schemas.microsoft.com/office/drawing/2010/main" Requires="a14">
+      <mc:AlternateContent xmlns:mc="http://schemas.openxmlformats.org/markup-compatibility/2006" xmlns:a14="http://schemas.microsoft.com/office/drawing/2010/main">
+        <mc:Choice Requires="a14">
           <p:sp>
             <p:nvSpPr>
               <p:cNvPr id="55" name="CasellaDiTesto 54">
@@ -12919,7 +12919,7 @@
             </p:txBody>
           </p:sp>
         </mc:Choice>
-        <mc:Fallback>
+        <mc:Fallback xmlns="">
           <p:sp>
             <p:nvSpPr>
               <p:cNvPr id="55" name="CasellaDiTesto 54">
@@ -13443,8 +13443,8 @@
           </a:fontRef>
         </p:style>
       </p:cxnSp>
-      <mc:AlternateContent xmlns:mc="http://schemas.openxmlformats.org/markup-compatibility/2006">
-        <mc:Choice xmlns:a14="http://schemas.microsoft.com/office/drawing/2010/main" Requires="a14">
+      <mc:AlternateContent xmlns:mc="http://schemas.openxmlformats.org/markup-compatibility/2006" xmlns:a14="http://schemas.microsoft.com/office/drawing/2010/main">
+        <mc:Choice Requires="a14">
           <p:sp>
             <p:nvSpPr>
               <p:cNvPr id="28" name="CasellaDiTesto 27">
@@ -13510,7 +13510,7 @@
             </p:txBody>
           </p:sp>
         </mc:Choice>
-        <mc:Fallback>
+        <mc:Fallback xmlns="">
           <p:sp>
             <p:nvSpPr>
               <p:cNvPr id="28" name="CasellaDiTesto 27">
@@ -13619,7 +13619,7 @@
         </p:blipFill>
         <p:spPr>
           <a:xfrm>
-            <a:off x="6402163" y="2959376"/>
+            <a:off x="6402163" y="2764065"/>
             <a:ext cx="2735126" cy="991099"/>
           </a:xfrm>
           <a:prstGeom prst="rect">
@@ -13636,13 +13636,15 @@
               </a:ext>
             </a:extLst>
           </p:cNvPr>
-          <p:cNvCxnSpPr/>
+          <p:cNvCxnSpPr>
+            <a:cxnSpLocks/>
+          </p:cNvCxnSpPr>
           <p:nvPr/>
         </p:nvCxnSpPr>
         <p:spPr>
           <a:xfrm>
             <a:off x="7687404" y="2414458"/>
-            <a:ext cx="0" cy="544918"/>
+            <a:ext cx="0" cy="349607"/>
           </a:xfrm>
           <a:prstGeom prst="straightConnector1">
             <a:avLst/>
@@ -13682,7 +13684,7 @@
             </p:nvSpPr>
             <p:spPr>
               <a:xfrm>
-                <a:off x="-1" y="3293651"/>
+                <a:off x="-1" y="3098340"/>
                 <a:ext cx="4572001" cy="523220"/>
               </a:xfrm>
               <a:prstGeom prst="rect">
@@ -13784,7 +13786,7 @@
             </p:nvSpPr>
             <p:spPr>
               <a:xfrm>
-                <a:off x="-1" y="3293651"/>
+                <a:off x="-1" y="3098340"/>
                 <a:ext cx="4572001" cy="523220"/>
               </a:xfrm>
               <a:prstGeom prst="rect">
@@ -13834,8 +13836,8 @@
         </p:blipFill>
         <p:spPr>
           <a:xfrm>
-            <a:off x="2430780" y="4314683"/>
-            <a:ext cx="4505130" cy="2440278"/>
+            <a:off x="2510874" y="3993066"/>
+            <a:ext cx="4116333" cy="2229680"/>
           </a:xfrm>
           <a:prstGeom prst="rect">
             <a:avLst/>
@@ -13856,7 +13858,7 @@
         </p:nvCxnSpPr>
         <p:spPr>
           <a:xfrm flipH="1">
-            <a:off x="4572000" y="3596640"/>
+            <a:off x="4572000" y="3401329"/>
             <a:ext cx="1747520" cy="0"/>
           </a:xfrm>
           <a:prstGeom prst="straightConnector1">
@@ -13891,6 +13893,7 @@
             </a:extLst>
           </p:cNvPr>
           <p:cNvCxnSpPr>
+            <a:cxnSpLocks/>
             <a:stCxn id="36" idx="2"/>
             <a:endCxn id="19" idx="0"/>
           </p:cNvCxnSpPr>
@@ -13898,12 +13901,12 @@
         </p:nvCxnSpPr>
         <p:spPr>
           <a:xfrm rot="16200000" flipH="1">
-            <a:off x="3235766" y="2867104"/>
-            <a:ext cx="497812" cy="2397345"/>
+            <a:off x="3241767" y="2665792"/>
+            <a:ext cx="371506" cy="2283041"/>
           </a:xfrm>
           <a:prstGeom prst="bentConnector3">
             <a:avLst>
-              <a:gd name="adj1" fmla="val 39795"/>
+              <a:gd name="adj1" fmla="val 50000"/>
             </a:avLst>
           </a:prstGeom>
           <a:ln>
@@ -13925,6 +13928,45 @@
           </a:fontRef>
         </p:style>
       </p:cxnSp>
+      <p:sp>
+        <p:nvSpPr>
+          <p:cNvPr id="21" name="CasellaDiTesto 20">
+            <a:extLst>
+              <a:ext uri="{FF2B5EF4-FFF2-40B4-BE49-F238E27FC236}">
+                <a16:creationId xmlns:a16="http://schemas.microsoft.com/office/drawing/2014/main" id="{9358826E-26A2-47D1-A40A-7A93DACAB6C2}"/>
+              </a:ext>
+            </a:extLst>
+          </p:cNvPr>
+          <p:cNvSpPr txBox="1"/>
+          <p:nvPr/>
+        </p:nvSpPr>
+        <p:spPr>
+          <a:xfrm>
+            <a:off x="3447449" y="6356350"/>
+            <a:ext cx="2243182" cy="307777"/>
+          </a:xfrm>
+          <a:prstGeom prst="rect">
+            <a:avLst/>
+          </a:prstGeom>
+          <a:noFill/>
+        </p:spPr>
+        <p:txBody>
+          <a:bodyPr wrap="square" rtlCol="0">
+            <a:spAutoFit/>
+          </a:bodyPr>
+          <a:lstStyle/>
+          <a:p>
+            <a:pPr algn="ctr"/>
+            <a:r>
+              <a:rPr lang="it-IT" sz="1400" b="1" dirty="0">
+                <a:latin typeface="Arial" panose="020B0604020202020204" pitchFamily="34" charset="0"/>
+                <a:cs typeface="Arial" panose="020B0604020202020204" pitchFamily="34" charset="0"/>
+              </a:rPr>
+              <a:t>L’algoritmo è terminato!</a:t>
+            </a:r>
+          </a:p>
+        </p:txBody>
+      </p:sp>
     </p:spTree>
     <p:extLst>
       <p:ext uri="{BB962C8B-B14F-4D97-AF65-F5344CB8AC3E}">
@@ -13964,7 +14006,7 @@
           <p:nvPr/>
         </p:nvPicPr>
         <p:blipFill>
-          <a:blip r:embed="rId3"/>
+          <a:blip r:embed="rId9"/>
           <a:stretch>
             <a:fillRect/>
           </a:stretch>
@@ -14215,8 +14257,8 @@
           </a:p>
         </p:txBody>
       </p:sp>
-      <mc:AlternateContent xmlns:mc="http://schemas.openxmlformats.org/markup-compatibility/2006">
-        <mc:Choice xmlns:a14="http://schemas.microsoft.com/office/drawing/2010/main" Requires="a14">
+      <mc:AlternateContent xmlns:mc="http://schemas.openxmlformats.org/markup-compatibility/2006" xmlns:a14="http://schemas.microsoft.com/office/drawing/2010/main">
+        <mc:Choice Requires="a14">
           <p:sp>
             <p:nvSpPr>
               <p:cNvPr id="33" name="CasellaDiTesto 32">
@@ -14386,7 +14428,7 @@
             </p:txBody>
           </p:sp>
         </mc:Choice>
-        <mc:Fallback>
+        <mc:Fallback xmlns="">
           <p:sp>
             <p:nvSpPr>
               <p:cNvPr id="33" name="CasellaDiTesto 32">
@@ -14410,7 +14452,7 @@
                 <a:avLst/>
               </a:prstGeom>
               <a:blipFill>
-                <a:blip r:embed="rId4"/>
+                <a:blip r:embed="rId10"/>
                 <a:stretch>
                   <a:fillRect l="-200" t="-1961" b="-19608"/>
                 </a:stretch>
@@ -14431,6 +14473,864 @@
           </p:sp>
         </mc:Fallback>
       </mc:AlternateContent>
+      <p:pic>
+        <p:nvPicPr>
+          <p:cNvPr id="3" name="Immagine 2">
+            <a:extLst>
+              <a:ext uri="{FF2B5EF4-FFF2-40B4-BE49-F238E27FC236}">
+                <a16:creationId xmlns:a16="http://schemas.microsoft.com/office/drawing/2014/main" id="{1BBB9CBA-BD57-4FF9-938C-0ACB28B146B2}"/>
+              </a:ext>
+            </a:extLst>
+          </p:cNvPr>
+          <p:cNvPicPr>
+            <a:picLocks noChangeAspect="1"/>
+          </p:cNvPicPr>
+          <p:nvPr/>
+        </p:nvPicPr>
+        <p:blipFill>
+          <a:blip r:embed="rId11"/>
+          <a:stretch>
+            <a:fillRect/>
+          </a:stretch>
+        </p:blipFill>
+        <p:spPr>
+          <a:xfrm>
+            <a:off x="9062" y="2113595"/>
+            <a:ext cx="3133633" cy="1189894"/>
+          </a:xfrm>
+          <a:prstGeom prst="rect">
+            <a:avLst/>
+          </a:prstGeom>
+        </p:spPr>
+      </p:pic>
+      <p:pic>
+        <p:nvPicPr>
+          <p:cNvPr id="16" name="Immagine 15">
+            <a:extLst>
+              <a:ext uri="{FF2B5EF4-FFF2-40B4-BE49-F238E27FC236}">
+                <a16:creationId xmlns:a16="http://schemas.microsoft.com/office/drawing/2014/main" id="{85D1E377-2E6B-4AA8-912E-55BE6CF48411}"/>
+              </a:ext>
+            </a:extLst>
+          </p:cNvPr>
+          <p:cNvPicPr>
+            <a:picLocks noChangeAspect="1"/>
+          </p:cNvPicPr>
+          <p:nvPr>
+            <p:custDataLst>
+              <p:tags r:id="rId1"/>
+            </p:custDataLst>
+          </p:nvPr>
+        </p:nvPicPr>
+        <p:blipFill>
+          <a:blip r:embed="rId12"/>
+          <a:stretch>
+            <a:fillRect/>
+          </a:stretch>
+        </p:blipFill>
+        <p:spPr>
+          <a:xfrm>
+            <a:off x="4022921" y="2251298"/>
+            <a:ext cx="4996607" cy="914487"/>
+          </a:xfrm>
+          <a:prstGeom prst="rect">
+            <a:avLst/>
+          </a:prstGeom>
+        </p:spPr>
+      </p:pic>
+      <p:cxnSp>
+        <p:nvCxnSpPr>
+          <p:cNvPr id="18" name="Connettore 2 17">
+            <a:extLst>
+              <a:ext uri="{FF2B5EF4-FFF2-40B4-BE49-F238E27FC236}">
+                <a16:creationId xmlns:a16="http://schemas.microsoft.com/office/drawing/2014/main" id="{AE008E4E-9B8D-4D2D-B2F5-849EDF25E22C}"/>
+              </a:ext>
+            </a:extLst>
+          </p:cNvPr>
+          <p:cNvCxnSpPr>
+            <a:stCxn id="3" idx="3"/>
+            <a:endCxn id="16" idx="1"/>
+          </p:cNvCxnSpPr>
+          <p:nvPr/>
+        </p:nvCxnSpPr>
+        <p:spPr>
+          <a:xfrm>
+            <a:off x="3142695" y="2708542"/>
+            <a:ext cx="880226" cy="0"/>
+          </a:xfrm>
+          <a:prstGeom prst="straightConnector1">
+            <a:avLst/>
+          </a:prstGeom>
+          <a:ln>
+            <a:tailEnd type="triangle"/>
+          </a:ln>
+        </p:spPr>
+        <p:style>
+          <a:lnRef idx="2">
+            <a:schemeClr val="accent1"/>
+          </a:lnRef>
+          <a:fillRef idx="0">
+            <a:schemeClr val="accent1"/>
+          </a:fillRef>
+          <a:effectRef idx="1">
+            <a:schemeClr val="accent1"/>
+          </a:effectRef>
+          <a:fontRef idx="minor">
+            <a:schemeClr val="tx1"/>
+          </a:fontRef>
+        </p:style>
+      </p:cxnSp>
+      <p:sp>
+        <p:nvSpPr>
+          <p:cNvPr id="24" name="CasellaDiTesto 23">
+            <a:extLst>
+              <a:ext uri="{FF2B5EF4-FFF2-40B4-BE49-F238E27FC236}">
+                <a16:creationId xmlns:a16="http://schemas.microsoft.com/office/drawing/2014/main" id="{DAAD4E65-013D-4226-B5A8-21B5F3CCF070}"/>
+              </a:ext>
+            </a:extLst>
+          </p:cNvPr>
+          <p:cNvSpPr txBox="1"/>
+          <p:nvPr/>
+        </p:nvSpPr>
+        <p:spPr>
+          <a:xfrm>
+            <a:off x="183" y="3468318"/>
+            <a:ext cx="9143817" cy="307777"/>
+          </a:xfrm>
+          <a:prstGeom prst="rect">
+            <a:avLst/>
+          </a:prstGeom>
+          <a:noFill/>
+        </p:spPr>
+        <p:txBody>
+          <a:bodyPr wrap="square" rtlCol="0">
+            <a:spAutoFit/>
+          </a:bodyPr>
+          <a:lstStyle/>
+          <a:p>
+            <a:pPr algn="ctr"/>
+            <a:r>
+              <a:rPr lang="it-IT" sz="1400" dirty="0">
+                <a:latin typeface="Arial" panose="020B0604020202020204" pitchFamily="34" charset="0"/>
+                <a:cs typeface="Arial" panose="020B0604020202020204" pitchFamily="34" charset="0"/>
+              </a:rPr>
+              <a:t>Il risultato mostra che c’è poca discrepanza tra le due matrici.</a:t>
+            </a:r>
+          </a:p>
+        </p:txBody>
+      </p:sp>
+      <p:cxnSp>
+        <p:nvCxnSpPr>
+          <p:cNvPr id="25" name="Connettore diritto 24">
+            <a:extLst>
+              <a:ext uri="{FF2B5EF4-FFF2-40B4-BE49-F238E27FC236}">
+                <a16:creationId xmlns:a16="http://schemas.microsoft.com/office/drawing/2014/main" id="{0F403E21-5EF8-48A7-B881-653B67263F43}"/>
+              </a:ext>
+            </a:extLst>
+          </p:cNvPr>
+          <p:cNvCxnSpPr>
+            <a:cxnSpLocks/>
+          </p:cNvCxnSpPr>
+          <p:nvPr/>
+        </p:nvCxnSpPr>
+        <p:spPr>
+          <a:xfrm flipV="1">
+            <a:off x="436880" y="3774337"/>
+            <a:ext cx="8098883" cy="60960"/>
+          </a:xfrm>
+          <a:prstGeom prst="line">
+            <a:avLst/>
+          </a:prstGeom>
+        </p:spPr>
+        <p:style>
+          <a:lnRef idx="2">
+            <a:schemeClr val="accent1"/>
+          </a:lnRef>
+          <a:fillRef idx="0">
+            <a:schemeClr val="accent1"/>
+          </a:fillRef>
+          <a:effectRef idx="1">
+            <a:schemeClr val="accent1"/>
+          </a:effectRef>
+          <a:fontRef idx="minor">
+            <a:schemeClr val="tx1"/>
+          </a:fontRef>
+        </p:style>
+      </p:cxnSp>
+      <p:sp>
+        <p:nvSpPr>
+          <p:cNvPr id="26" name="CasellaDiTesto 25">
+            <a:extLst>
+              <a:ext uri="{FF2B5EF4-FFF2-40B4-BE49-F238E27FC236}">
+                <a16:creationId xmlns:a16="http://schemas.microsoft.com/office/drawing/2014/main" id="{2E379512-7B58-4DB3-8F7E-C11A404B9A9E}"/>
+              </a:ext>
+            </a:extLst>
+          </p:cNvPr>
+          <p:cNvSpPr txBox="1"/>
+          <p:nvPr/>
+        </p:nvSpPr>
+        <p:spPr>
+          <a:xfrm>
+            <a:off x="-185" y="3893962"/>
+            <a:ext cx="2663486" cy="369332"/>
+          </a:xfrm>
+          <a:prstGeom prst="rect">
+            <a:avLst/>
+          </a:prstGeom>
+          <a:noFill/>
+        </p:spPr>
+        <p:txBody>
+          <a:bodyPr wrap="square" rtlCol="0">
+            <a:spAutoFit/>
+          </a:bodyPr>
+          <a:lstStyle/>
+          <a:p>
+            <a:r>
+              <a:rPr lang="it-IT" i="1" dirty="0">
+                <a:latin typeface="Arial"/>
+                <a:cs typeface="Arial"/>
+              </a:rPr>
+              <a:t>Complessità Temporale</a:t>
+            </a:r>
+          </a:p>
+        </p:txBody>
+      </p:sp>
+      <mc:AlternateContent xmlns:mc="http://schemas.openxmlformats.org/markup-compatibility/2006">
+        <mc:Choice xmlns:a14="http://schemas.microsoft.com/office/drawing/2010/main" Requires="a14">
+          <p:sp>
+            <p:nvSpPr>
+              <p:cNvPr id="27" name="CasellaDiTesto 26">
+                <a:extLst>
+                  <a:ext uri="{FF2B5EF4-FFF2-40B4-BE49-F238E27FC236}">
+                    <a16:creationId xmlns:a16="http://schemas.microsoft.com/office/drawing/2014/main" id="{D66383F1-F80A-4597-B2F9-F46154378BAA}"/>
+                  </a:ext>
+                </a:extLst>
+              </p:cNvPr>
+              <p:cNvSpPr txBox="1"/>
+              <p:nvPr/>
+            </p:nvSpPr>
+            <p:spPr>
+              <a:xfrm>
+                <a:off x="9063" y="4302484"/>
+                <a:ext cx="5468460" cy="738664"/>
+              </a:xfrm>
+              <a:prstGeom prst="rect">
+                <a:avLst/>
+              </a:prstGeom>
+              <a:noFill/>
+            </p:spPr>
+            <p:txBody>
+              <a:bodyPr wrap="square" rtlCol="0">
+                <a:spAutoFit/>
+              </a:bodyPr>
+              <a:lstStyle/>
+              <a:p>
+                <a:r>
+                  <a:rPr lang="it-IT" sz="1400" dirty="0">
+                    <a:latin typeface="Arial" panose="020B0604020202020204" pitchFamily="34" charset="0"/>
+                    <a:cs typeface="Arial" panose="020B0604020202020204" pitchFamily="34" charset="0"/>
+                  </a:rPr>
+                  <a:t>2 step:</a:t>
+                </a:r>
+              </a:p>
+              <a:p>
+                <a:pPr marL="285750" indent="-285750">
+                  <a:buFont typeface="Arial" panose="020B0604020202020204" pitchFamily="34" charset="0"/>
+                  <a:buChar char="•"/>
+                </a:pPr>
+                <a:r>
+                  <a:rPr lang="it-IT" sz="1400" dirty="0">
+                    <a:latin typeface="Arial" panose="020B0604020202020204" pitchFamily="34" charset="0"/>
+                    <a:cs typeface="Arial" panose="020B0604020202020204" pitchFamily="34" charset="0"/>
+                  </a:rPr>
+                  <a:t>Crea       e cerca l’elemento minimo</a:t>
+                </a:r>
+              </a:p>
+              <a:p>
+                <a:pPr marL="285750" indent="-285750">
+                  <a:buFont typeface="Arial" panose="020B0604020202020204" pitchFamily="34" charset="0"/>
+                  <a:buChar char="•"/>
+                </a:pPr>
+                <a:r>
+                  <a:rPr lang="it-IT" sz="1400" dirty="0">
+                    <a:latin typeface="Arial" panose="020B0604020202020204" pitchFamily="34" charset="0"/>
+                    <a:cs typeface="Arial" panose="020B0604020202020204" pitchFamily="34" charset="0"/>
+                  </a:rPr>
+                  <a:t>Calcola il </a:t>
+                </a:r>
+                <a:r>
+                  <a:rPr lang="it-IT" sz="1400" i="1" dirty="0">
+                    <a:latin typeface="Arial" panose="020B0604020202020204" pitchFamily="34" charset="0"/>
+                    <a:cs typeface="Arial" panose="020B0604020202020204" pitchFamily="34" charset="0"/>
+                  </a:rPr>
+                  <a:t>delta</a:t>
+                </a:r>
+                <a:r>
+                  <a:rPr lang="it-IT" sz="1400" dirty="0">
+                    <a:latin typeface="Arial" panose="020B0604020202020204" pitchFamily="34" charset="0"/>
+                    <a:cs typeface="Arial" panose="020B0604020202020204" pitchFamily="34" charset="0"/>
+                  </a:rPr>
+                  <a:t>, il peso degli arti ed infine aggiorna la matrice </a:t>
+                </a:r>
+                <a14:m>
+                  <m:oMath xmlns:m="http://schemas.openxmlformats.org/officeDocument/2006/math">
+                    <m:r>
+                      <a:rPr lang="it-IT" sz="1400" b="0" i="1" smtClean="0">
+                        <a:latin typeface="Cambria Math" panose="02040503050406030204" pitchFamily="18" charset="0"/>
+                        <a:cs typeface="Arial" panose="020B0604020202020204" pitchFamily="34" charset="0"/>
+                      </a:rPr>
+                      <m:t>𝐷</m:t>
+                    </m:r>
+                  </m:oMath>
+                </a14:m>
+                <a:endParaRPr lang="it-IT" sz="1400" dirty="0">
+                  <a:latin typeface="Arial" panose="020B0604020202020204" pitchFamily="34" charset="0"/>
+                  <a:cs typeface="Arial" panose="020B0604020202020204" pitchFamily="34" charset="0"/>
+                </a:endParaRPr>
+              </a:p>
+            </p:txBody>
+          </p:sp>
+        </mc:Choice>
+        <mc:Fallback>
+          <p:sp>
+            <p:nvSpPr>
+              <p:cNvPr id="27" name="CasellaDiTesto 26">
+                <a:extLst>
+                  <a:ext uri="{FF2B5EF4-FFF2-40B4-BE49-F238E27FC236}">
+                    <a16:creationId xmlns:a16="http://schemas.microsoft.com/office/drawing/2014/main" id="{D66383F1-F80A-4597-B2F9-F46154378BAA}"/>
+                  </a:ext>
+                </a:extLst>
+              </p:cNvPr>
+              <p:cNvSpPr txBox="1">
+                <a:spLocks noRot="1" noChangeAspect="1" noMove="1" noResize="1" noEditPoints="1" noAdjustHandles="1" noChangeArrowheads="1" noChangeShapeType="1" noTextEdit="1"/>
+              </p:cNvSpPr>
+              <p:nvPr/>
+            </p:nvSpPr>
+            <p:spPr>
+              <a:xfrm>
+                <a:off x="9063" y="4302484"/>
+                <a:ext cx="5468460" cy="738664"/>
+              </a:xfrm>
+              <a:prstGeom prst="rect">
+                <a:avLst/>
+              </a:prstGeom>
+              <a:blipFill>
+                <a:blip r:embed="rId13"/>
+                <a:stretch>
+                  <a:fillRect l="-334" t="-1653" b="-7438"/>
+                </a:stretch>
+              </a:blipFill>
+            </p:spPr>
+            <p:txBody>
+              <a:bodyPr/>
+              <a:lstStyle/>
+              <a:p>
+                <a:r>
+                  <a:rPr lang="it-IT">
+                    <a:noFill/>
+                  </a:rPr>
+                  <a:t> </a:t>
+                </a:r>
+              </a:p>
+            </p:txBody>
+          </p:sp>
+        </mc:Fallback>
+      </mc:AlternateContent>
+      <p:pic>
+        <p:nvPicPr>
+          <p:cNvPr id="28" name="Immagine 27">
+            <a:extLst>
+              <a:ext uri="{FF2B5EF4-FFF2-40B4-BE49-F238E27FC236}">
+                <a16:creationId xmlns:a16="http://schemas.microsoft.com/office/drawing/2014/main" id="{2B192171-216A-4F85-B932-718D8F7666EE}"/>
+              </a:ext>
+            </a:extLst>
+          </p:cNvPr>
+          <p:cNvPicPr>
+            <a:picLocks noChangeAspect="1"/>
+          </p:cNvPicPr>
+          <p:nvPr>
+            <p:custDataLst>
+              <p:tags r:id="rId2"/>
+            </p:custDataLst>
+          </p:nvPr>
+        </p:nvPicPr>
+        <p:blipFill>
+          <a:blip r:embed="rId14"/>
+          <a:stretch>
+            <a:fillRect/>
+          </a:stretch>
+        </p:blipFill>
+        <p:spPr>
+          <a:xfrm>
+            <a:off x="802641" y="4593578"/>
+            <a:ext cx="284479" cy="166420"/>
+          </a:xfrm>
+          <a:prstGeom prst="rect">
+            <a:avLst/>
+          </a:prstGeom>
+        </p:spPr>
+      </p:pic>
+      <p:pic>
+        <p:nvPicPr>
+          <p:cNvPr id="22" name="Immagine 21">
+            <a:extLst>
+              <a:ext uri="{FF2B5EF4-FFF2-40B4-BE49-F238E27FC236}">
+                <a16:creationId xmlns:a16="http://schemas.microsoft.com/office/drawing/2014/main" id="{1EB13141-CF8B-4CB1-BBBC-2C0AA67D822B}"/>
+              </a:ext>
+            </a:extLst>
+          </p:cNvPr>
+          <p:cNvPicPr>
+            <a:picLocks noChangeAspect="1"/>
+          </p:cNvPicPr>
+          <p:nvPr>
+            <p:custDataLst>
+              <p:tags r:id="rId3"/>
+            </p:custDataLst>
+          </p:nvPr>
+        </p:nvPicPr>
+        <p:blipFill>
+          <a:blip r:embed="rId15"/>
+          <a:stretch>
+            <a:fillRect/>
+          </a:stretch>
+        </p:blipFill>
+        <p:spPr>
+          <a:xfrm>
+            <a:off x="3703873" y="4580380"/>
+            <a:ext cx="2377330" cy="185375"/>
+          </a:xfrm>
+          <a:prstGeom prst="rect">
+            <a:avLst/>
+          </a:prstGeom>
+        </p:spPr>
+      </p:pic>
+      <p:cxnSp>
+        <p:nvCxnSpPr>
+          <p:cNvPr id="30" name="Connettore 2 29">
+            <a:extLst>
+              <a:ext uri="{FF2B5EF4-FFF2-40B4-BE49-F238E27FC236}">
+                <a16:creationId xmlns:a16="http://schemas.microsoft.com/office/drawing/2014/main" id="{CB9DA538-BBDF-414F-92B5-448543060733}"/>
+              </a:ext>
+            </a:extLst>
+          </p:cNvPr>
+          <p:cNvCxnSpPr>
+            <a:cxnSpLocks/>
+          </p:cNvCxnSpPr>
+          <p:nvPr/>
+        </p:nvCxnSpPr>
+        <p:spPr>
+          <a:xfrm>
+            <a:off x="3240351" y="4671816"/>
+            <a:ext cx="369091" cy="0"/>
+          </a:xfrm>
+          <a:prstGeom prst="straightConnector1">
+            <a:avLst/>
+          </a:prstGeom>
+          <a:ln>
+            <a:tailEnd type="triangle"/>
+          </a:ln>
+        </p:spPr>
+        <p:style>
+          <a:lnRef idx="2">
+            <a:schemeClr val="accent1"/>
+          </a:lnRef>
+          <a:fillRef idx="0">
+            <a:schemeClr val="accent1"/>
+          </a:fillRef>
+          <a:effectRef idx="1">
+            <a:schemeClr val="accent1"/>
+          </a:effectRef>
+          <a:fontRef idx="minor">
+            <a:schemeClr val="tx1"/>
+          </a:fontRef>
+        </p:style>
+      </p:cxnSp>
+      <p:pic>
+        <p:nvPicPr>
+          <p:cNvPr id="39" name="Immagine 38">
+            <a:extLst>
+              <a:ext uri="{FF2B5EF4-FFF2-40B4-BE49-F238E27FC236}">
+                <a16:creationId xmlns:a16="http://schemas.microsoft.com/office/drawing/2014/main" id="{01CE4583-1FE6-44C8-BFE8-44A282FA28DA}"/>
+              </a:ext>
+            </a:extLst>
+          </p:cNvPr>
+          <p:cNvPicPr>
+            <a:picLocks noChangeAspect="1"/>
+          </p:cNvPicPr>
+          <p:nvPr>
+            <p:custDataLst>
+              <p:tags r:id="rId4"/>
+            </p:custDataLst>
+          </p:nvPr>
+        </p:nvPicPr>
+        <p:blipFill>
+          <a:blip r:embed="rId16"/>
+          <a:stretch>
+            <a:fillRect/>
+          </a:stretch>
+        </p:blipFill>
+        <p:spPr>
+          <a:xfrm>
+            <a:off x="5735951" y="4810764"/>
+            <a:ext cx="1176779" cy="166135"/>
+          </a:xfrm>
+          <a:prstGeom prst="rect">
+            <a:avLst/>
+          </a:prstGeom>
+        </p:spPr>
+      </p:pic>
+      <p:cxnSp>
+        <p:nvCxnSpPr>
+          <p:cNvPr id="41" name="Connettore 2 40">
+            <a:extLst>
+              <a:ext uri="{FF2B5EF4-FFF2-40B4-BE49-F238E27FC236}">
+                <a16:creationId xmlns:a16="http://schemas.microsoft.com/office/drawing/2014/main" id="{51475641-586A-43E0-AA40-70B60EE85942}"/>
+              </a:ext>
+            </a:extLst>
+          </p:cNvPr>
+          <p:cNvCxnSpPr/>
+          <p:nvPr/>
+        </p:nvCxnSpPr>
+        <p:spPr>
+          <a:xfrm>
+            <a:off x="5379868" y="4893831"/>
+            <a:ext cx="275208" cy="0"/>
+          </a:xfrm>
+          <a:prstGeom prst="straightConnector1">
+            <a:avLst/>
+          </a:prstGeom>
+          <a:ln>
+            <a:tailEnd type="triangle"/>
+          </a:ln>
+        </p:spPr>
+        <p:style>
+          <a:lnRef idx="2">
+            <a:schemeClr val="accent1"/>
+          </a:lnRef>
+          <a:fillRef idx="0">
+            <a:schemeClr val="accent1"/>
+          </a:fillRef>
+          <a:effectRef idx="1">
+            <a:schemeClr val="accent1"/>
+          </a:effectRef>
+          <a:fontRef idx="minor">
+            <a:schemeClr val="tx1"/>
+          </a:fontRef>
+        </p:style>
+      </p:cxnSp>
+      <p:pic>
+        <p:nvPicPr>
+          <p:cNvPr id="45" name="Immagine 44">
+            <a:extLst>
+              <a:ext uri="{FF2B5EF4-FFF2-40B4-BE49-F238E27FC236}">
+                <a16:creationId xmlns:a16="http://schemas.microsoft.com/office/drawing/2014/main" id="{1BA9652B-EEC5-4F43-952B-E1B15E552D30}"/>
+              </a:ext>
+            </a:extLst>
+          </p:cNvPr>
+          <p:cNvPicPr>
+            <a:picLocks noChangeAspect="1"/>
+          </p:cNvPicPr>
+          <p:nvPr>
+            <p:custDataLst>
+              <p:tags r:id="rId5"/>
+            </p:custDataLst>
+          </p:nvPr>
+        </p:nvPicPr>
+        <p:blipFill>
+          <a:blip r:embed="rId17"/>
+          <a:stretch>
+            <a:fillRect/>
+          </a:stretch>
+        </p:blipFill>
+        <p:spPr>
+          <a:xfrm>
+            <a:off x="1471272" y="5287366"/>
+            <a:ext cx="6201456" cy="231310"/>
+          </a:xfrm>
+          <a:prstGeom prst="rect">
+            <a:avLst/>
+          </a:prstGeom>
+        </p:spPr>
+      </p:pic>
+      <mc:AlternateContent xmlns:mc="http://schemas.openxmlformats.org/markup-compatibility/2006">
+        <mc:Choice xmlns:a14="http://schemas.microsoft.com/office/drawing/2010/main" Requires="a14">
+          <p:sp>
+            <p:nvSpPr>
+              <p:cNvPr id="50" name="CasellaDiTesto 49">
+                <a:extLst>
+                  <a:ext uri="{FF2B5EF4-FFF2-40B4-BE49-F238E27FC236}">
+                    <a16:creationId xmlns:a16="http://schemas.microsoft.com/office/drawing/2014/main" id="{11358FDD-7B19-40D0-A395-30676A6BCD14}"/>
+                  </a:ext>
+                </a:extLst>
+              </p:cNvPr>
+              <p:cNvSpPr txBox="1"/>
+              <p:nvPr/>
+            </p:nvSpPr>
+            <p:spPr>
+              <a:xfrm>
+                <a:off x="-185" y="5826915"/>
+                <a:ext cx="9143817" cy="307777"/>
+              </a:xfrm>
+              <a:prstGeom prst="rect">
+                <a:avLst/>
+              </a:prstGeom>
+              <a:noFill/>
+            </p:spPr>
+            <p:txBody>
+              <a:bodyPr wrap="square" rtlCol="0">
+                <a:spAutoFit/>
+              </a:bodyPr>
+              <a:lstStyle/>
+              <a:p>
+                <a:pPr algn="ctr"/>
+                <a:r>
+                  <a:rPr lang="it-IT" sz="1400" dirty="0">
+                    <a:latin typeface="Arial" panose="020B0604020202020204" pitchFamily="34" charset="0"/>
+                    <a:cs typeface="Arial" panose="020B0604020202020204" pitchFamily="34" charset="0"/>
+                  </a:rPr>
+                  <a:t>Eseguito tante volte quante sono le foglie in </a:t>
+                </a:r>
+                <a14:m>
+                  <m:oMath xmlns:m="http://schemas.openxmlformats.org/officeDocument/2006/math">
+                    <m:r>
+                      <a:rPr lang="it-IT" sz="1400" b="0" i="1" smtClean="0">
+                        <a:latin typeface="Cambria Math" panose="02040503050406030204" pitchFamily="18" charset="0"/>
+                        <a:cs typeface="Arial" panose="020B0604020202020204" pitchFamily="34" charset="0"/>
+                      </a:rPr>
+                      <m:t>𝐷</m:t>
+                    </m:r>
+                  </m:oMath>
+                </a14:m>
+                <a:r>
+                  <a:rPr lang="it-IT" sz="1400" dirty="0">
+                    <a:latin typeface="Arial" panose="020B0604020202020204" pitchFamily="34" charset="0"/>
+                    <a:cs typeface="Arial" panose="020B0604020202020204" pitchFamily="34" charset="0"/>
+                  </a:rPr>
+                  <a:t>, quindi </a:t>
+                </a:r>
+                <a14:m>
+                  <m:oMath xmlns:m="http://schemas.openxmlformats.org/officeDocument/2006/math">
+                    <m:r>
+                      <a:rPr lang="it-IT" sz="1400" b="0" i="1" smtClean="0">
+                        <a:latin typeface="Cambria Math" panose="02040503050406030204" pitchFamily="18" charset="0"/>
+                        <a:cs typeface="Arial" panose="020B0604020202020204" pitchFamily="34" charset="0"/>
+                      </a:rPr>
+                      <m:t>𝑛</m:t>
+                    </m:r>
+                  </m:oMath>
+                </a14:m>
+                <a:r>
+                  <a:rPr lang="it-IT" sz="1400" dirty="0">
+                    <a:latin typeface="Arial" panose="020B0604020202020204" pitchFamily="34" charset="0"/>
+                    <a:cs typeface="Arial" panose="020B0604020202020204" pitchFamily="34" charset="0"/>
+                  </a:rPr>
+                  <a:t> volte</a:t>
+                </a:r>
+              </a:p>
+            </p:txBody>
+          </p:sp>
+        </mc:Choice>
+        <mc:Fallback>
+          <p:sp>
+            <p:nvSpPr>
+              <p:cNvPr id="50" name="CasellaDiTesto 49">
+                <a:extLst>
+                  <a:ext uri="{FF2B5EF4-FFF2-40B4-BE49-F238E27FC236}">
+                    <a16:creationId xmlns:a16="http://schemas.microsoft.com/office/drawing/2014/main" id="{11358FDD-7B19-40D0-A395-30676A6BCD14}"/>
+                  </a:ext>
+                </a:extLst>
+              </p:cNvPr>
+              <p:cNvSpPr txBox="1">
+                <a:spLocks noRot="1" noChangeAspect="1" noMove="1" noResize="1" noEditPoints="1" noAdjustHandles="1" noChangeArrowheads="1" noChangeShapeType="1" noTextEdit="1"/>
+              </p:cNvSpPr>
+              <p:nvPr/>
+            </p:nvSpPr>
+            <p:spPr>
+              <a:xfrm>
+                <a:off x="-185" y="5826915"/>
+                <a:ext cx="9143817" cy="307777"/>
+              </a:xfrm>
+              <a:prstGeom prst="rect">
+                <a:avLst/>
+              </a:prstGeom>
+              <a:blipFill>
+                <a:blip r:embed="rId18"/>
+                <a:stretch>
+                  <a:fillRect t="-4000" b="-20000"/>
+                </a:stretch>
+              </a:blipFill>
+            </p:spPr>
+            <p:txBody>
+              <a:bodyPr/>
+              <a:lstStyle/>
+              <a:p>
+                <a:r>
+                  <a:rPr lang="it-IT">
+                    <a:noFill/>
+                  </a:rPr>
+                  <a:t> </a:t>
+                </a:r>
+              </a:p>
+            </p:txBody>
+          </p:sp>
+        </mc:Fallback>
+      </mc:AlternateContent>
+      <p:pic>
+        <p:nvPicPr>
+          <p:cNvPr id="51" name="Immagine 50">
+            <a:extLst>
+              <a:ext uri="{FF2B5EF4-FFF2-40B4-BE49-F238E27FC236}">
+                <a16:creationId xmlns:a16="http://schemas.microsoft.com/office/drawing/2014/main" id="{A583B48E-1844-4F31-B2F9-0B7A3DBC741F}"/>
+              </a:ext>
+            </a:extLst>
+          </p:cNvPr>
+          <p:cNvPicPr>
+            <a:picLocks noChangeAspect="1"/>
+          </p:cNvPicPr>
+          <p:nvPr>
+            <p:custDataLst>
+              <p:tags r:id="rId6"/>
+            </p:custDataLst>
+          </p:nvPr>
+        </p:nvPicPr>
+        <p:blipFill>
+          <a:blip r:embed="rId19"/>
+          <a:stretch>
+            <a:fillRect/>
+          </a:stretch>
+        </p:blipFill>
+        <p:spPr>
+          <a:xfrm>
+            <a:off x="1917466" y="6428968"/>
+            <a:ext cx="5308514" cy="271048"/>
+          </a:xfrm>
+          <a:prstGeom prst="rect">
+            <a:avLst/>
+          </a:prstGeom>
+        </p:spPr>
+      </p:pic>
+      <p:cxnSp>
+        <p:nvCxnSpPr>
+          <p:cNvPr id="54" name="Connettore 2 53">
+            <a:extLst>
+              <a:ext uri="{FF2B5EF4-FFF2-40B4-BE49-F238E27FC236}">
+                <a16:creationId xmlns:a16="http://schemas.microsoft.com/office/drawing/2014/main" id="{F776919D-8410-4C21-AF2A-90150C2A68C1}"/>
+              </a:ext>
+            </a:extLst>
+          </p:cNvPr>
+          <p:cNvCxnSpPr/>
+          <p:nvPr/>
+        </p:nvCxnSpPr>
+        <p:spPr>
+          <a:xfrm>
+            <a:off x="4566223" y="5049061"/>
+            <a:ext cx="0" cy="174056"/>
+          </a:xfrm>
+          <a:prstGeom prst="straightConnector1">
+            <a:avLst/>
+          </a:prstGeom>
+          <a:ln>
+            <a:tailEnd type="triangle"/>
+          </a:ln>
+        </p:spPr>
+        <p:style>
+          <a:lnRef idx="2">
+            <a:schemeClr val="accent1"/>
+          </a:lnRef>
+          <a:fillRef idx="0">
+            <a:schemeClr val="accent1"/>
+          </a:fillRef>
+          <a:effectRef idx="1">
+            <a:schemeClr val="accent1"/>
+          </a:effectRef>
+          <a:fontRef idx="minor">
+            <a:schemeClr val="tx1"/>
+          </a:fontRef>
+        </p:style>
+      </p:cxnSp>
+      <p:cxnSp>
+        <p:nvCxnSpPr>
+          <p:cNvPr id="56" name="Connettore 2 55">
+            <a:extLst>
+              <a:ext uri="{FF2B5EF4-FFF2-40B4-BE49-F238E27FC236}">
+                <a16:creationId xmlns:a16="http://schemas.microsoft.com/office/drawing/2014/main" id="{E515FCDB-5805-421E-AA51-3CFD049A6A40}"/>
+              </a:ext>
+            </a:extLst>
+          </p:cNvPr>
+          <p:cNvCxnSpPr>
+            <a:stCxn id="45" idx="2"/>
+            <a:endCxn id="50" idx="0"/>
+          </p:cNvCxnSpPr>
+          <p:nvPr/>
+        </p:nvCxnSpPr>
+        <p:spPr>
+          <a:xfrm flipH="1">
+            <a:off x="4571724" y="5518676"/>
+            <a:ext cx="276" cy="308239"/>
+          </a:xfrm>
+          <a:prstGeom prst="straightConnector1">
+            <a:avLst/>
+          </a:prstGeom>
+          <a:ln>
+            <a:tailEnd type="triangle"/>
+          </a:ln>
+        </p:spPr>
+        <p:style>
+          <a:lnRef idx="2">
+            <a:schemeClr val="accent1"/>
+          </a:lnRef>
+          <a:fillRef idx="0">
+            <a:schemeClr val="accent1"/>
+          </a:fillRef>
+          <a:effectRef idx="1">
+            <a:schemeClr val="accent1"/>
+          </a:effectRef>
+          <a:fontRef idx="minor">
+            <a:schemeClr val="tx1"/>
+          </a:fontRef>
+        </p:style>
+      </p:cxnSp>
+      <p:cxnSp>
+        <p:nvCxnSpPr>
+          <p:cNvPr id="58" name="Connettore 2 57">
+            <a:extLst>
+              <a:ext uri="{FF2B5EF4-FFF2-40B4-BE49-F238E27FC236}">
+                <a16:creationId xmlns:a16="http://schemas.microsoft.com/office/drawing/2014/main" id="{DCB1334B-7B61-4857-97FA-820154D9844C}"/>
+              </a:ext>
+            </a:extLst>
+          </p:cNvPr>
+          <p:cNvCxnSpPr>
+            <a:stCxn id="50" idx="2"/>
+            <a:endCxn id="51" idx="0"/>
+          </p:cNvCxnSpPr>
+          <p:nvPr/>
+        </p:nvCxnSpPr>
+        <p:spPr>
+          <a:xfrm flipH="1">
+            <a:off x="4571723" y="6134692"/>
+            <a:ext cx="1" cy="294276"/>
+          </a:xfrm>
+          <a:prstGeom prst="straightConnector1">
+            <a:avLst/>
+          </a:prstGeom>
+          <a:ln>
+            <a:tailEnd type="triangle"/>
+          </a:ln>
+        </p:spPr>
+        <p:style>
+          <a:lnRef idx="2">
+            <a:schemeClr val="accent1"/>
+          </a:lnRef>
+          <a:fillRef idx="0">
+            <a:schemeClr val="accent1"/>
+          </a:fillRef>
+          <a:effectRef idx="1">
+            <a:schemeClr val="accent1"/>
+          </a:effectRef>
+          <a:fontRef idx="minor">
+            <a:schemeClr val="tx1"/>
+          </a:fontRef>
+        </p:style>
+      </p:cxnSp>
     </p:spTree>
     <p:extLst>
       <p:ext uri="{BB962C8B-B14F-4D97-AF65-F5344CB8AC3E}">
@@ -22784,6 +23684,120 @@
   <p:tag name="LATEXADDIN" val="\documentclass{article}&#10;\usepackage{amsmath}&#10;\pagestyle{empty}&#10;\begin{document}&#10;&#10;$\forall u\in D\setminus \, \{f,b\}, \; D_{up}=\frac{D_{fu}+D_{bu}-D_{fb}}{2}$&#10;&#10;&#10;\end{document}"/>
   <p:tag name="IGUANATEXSIZE" val="14"/>
   <p:tag name="IGUANATEXCURSOR" val="159"/>
+  <p:tag name="TRANSPARENCY" val="Vero"/>
+  <p:tag name="FILENAME" val=""/>
+  <p:tag name="LATEXENGINEID" val="0"/>
+  <p:tag name="TEMPFOLDER" val="c:\temp\"/>
+  <p:tag name="LATEXFORMHEIGHT" val="312"/>
+  <p:tag name="LATEXFORMWIDTH" val="384"/>
+  <p:tag name="LATEXFORMWRAP" val="Vero"/>
+  <p:tag name="BITMAPVECTOR" val="0"/>
+</p:tagLst>
+</file>
+
+<file path=ppt/tags/tag32.xml><?xml version="1.0" encoding="utf-8"?>
+<p:tagLst xmlns:a="http://schemas.openxmlformats.org/drawingml/2006/main" xmlns:r="http://schemas.openxmlformats.org/officeDocument/2006/relationships" xmlns:p="http://schemas.openxmlformats.org/presentationml/2006/main">
+  <p:tag name="OUTPUTDPI" val="1200"/>
+  <p:tag name="ORIGINALHEIGHT" val="621,6723"/>
+  <p:tag name="ORIGINALWIDTH" val="3415,823"/>
+  <p:tag name="LATEXADDIN" val="\documentclass{article}&#10;\usepackage{amsmath}&#10;\pagestyle{empty}&#10;\begin{document}&#10;&#10;\[Discrepancy(D(T),D)=\sum_{i=1}^{j-1}\sum_{j=i+1}^{n}(D_{ij}(T)-D_{ij})^2=\]&#10;\[=0+(3,5-4)^2+(3,5-3)^2+(4,5-4)^2+(4,5-5)^2+0=1\]&#10;&#10;&#10;\end{document}"/>
+  <p:tag name="IGUANATEXSIZE" val="20"/>
+  <p:tag name="IGUANATEXCURSOR" val="156"/>
+  <p:tag name="TRANSPARENCY" val="Vero"/>
+  <p:tag name="FILENAME" val=""/>
+  <p:tag name="LATEXENGINEID" val="0"/>
+  <p:tag name="TEMPFOLDER" val="c:\temp\"/>
+  <p:tag name="LATEXFORMHEIGHT" val="312"/>
+  <p:tag name="LATEXFORMWIDTH" val="384"/>
+  <p:tag name="LATEXFORMWRAP" val="Vero"/>
+  <p:tag name="BITMAPVECTOR" val="0"/>
+</p:tagLst>
+</file>
+
+<file path=ppt/tags/tag33.xml><?xml version="1.0" encoding="utf-8"?>
+<p:tagLst xmlns:a="http://schemas.openxmlformats.org/drawingml/2006/main" xmlns:r="http://schemas.openxmlformats.org/officeDocument/2006/relationships" xmlns:p="http://schemas.openxmlformats.org/presentationml/2006/main">
+  <p:tag name="OUTPUTDPI" val="1200"/>
+  <p:tag name="ORIGINALHEIGHT" val="87,73905"/>
+  <p:tag name="ORIGINALWIDTH" val="149,9813"/>
+  <p:tag name="LATEXADDIN" val="\documentclass{article}&#10;\usepackage{amsmath}&#10;\pagestyle{empty}&#10;\begin{document}&#10;&#10;&#10;$D^\star$&#10;&#10;\end{document}"/>
+  <p:tag name="IGUANATEXSIZE" val="14"/>
+  <p:tag name="IGUANATEXCURSOR" val="90"/>
+  <p:tag name="TRANSPARENCY" val="Vero"/>
+  <p:tag name="FILENAME" val=""/>
+  <p:tag name="LATEXENGINEID" val="0"/>
+  <p:tag name="TEMPFOLDER" val="c:\temp\"/>
+  <p:tag name="LATEXFORMHEIGHT" val="312"/>
+  <p:tag name="LATEXFORMWIDTH" val="384"/>
+  <p:tag name="LATEXFORMWRAP" val="Vero"/>
+  <p:tag name="BITMAPVECTOR" val="0"/>
+</p:tagLst>
+</file>
+
+<file path=ppt/tags/tag34.xml><?xml version="1.0" encoding="utf-8"?>
+<p:tagLst xmlns:a="http://schemas.openxmlformats.org/drawingml/2006/main" xmlns:r="http://schemas.openxmlformats.org/officeDocument/2006/relationships" xmlns:p="http://schemas.openxmlformats.org/presentationml/2006/main">
+  <p:tag name="OUTPUTDPI" val="1200"/>
+  <p:tag name="ORIGINALHEIGHT" val="140,9824"/>
+  <p:tag name="ORIGINALWIDTH" val="1808,024"/>
+  <p:tag name="LATEXADDIN" val="\documentclass{article}&#10;\usepackage{amsmath}&#10;\pagestyle{empty}&#10;\begin{document}&#10;&#10; \[T(step1)=O(n) \times O(n)=O(n^2)\]&#10;&#10;&#10;\end{document}"/>
+  <p:tag name="IGUANATEXSIZE" val="20"/>
+  <p:tag name="IGUANATEXCURSOR" val="118"/>
+  <p:tag name="TRANSPARENCY" val="Vero"/>
+  <p:tag name="FILENAME" val=""/>
+  <p:tag name="LATEXENGINEID" val="0"/>
+  <p:tag name="TEMPFOLDER" val="c:\temp\"/>
+  <p:tag name="LATEXFORMHEIGHT" val="312"/>
+  <p:tag name="LATEXFORMWIDTH" val="384"/>
+  <p:tag name="LATEXFORMWRAP" val="Vero"/>
+  <p:tag name="BITMAPVECTOR" val="0"/>
+</p:tagLst>
+</file>
+
+<file path=ppt/tags/tag35.xml><?xml version="1.0" encoding="utf-8"?>
+<p:tagLst xmlns:a="http://schemas.openxmlformats.org/drawingml/2006/main" xmlns:r="http://schemas.openxmlformats.org/officeDocument/2006/relationships" xmlns:p="http://schemas.openxmlformats.org/presentationml/2006/main">
+  <p:tag name="OUTPUTDPI" val="1200"/>
+  <p:tag name="ORIGINALHEIGHT" val="125,2343"/>
+  <p:tag name="ORIGINALWIDTH" val="894,6382"/>
+  <p:tag name="LATEXADDIN" val="\documentclass{article}&#10;\usepackage{amsmath}&#10;\pagestyle{empty}&#10;\begin{document}&#10;&#10;\[T(step2)=O(n)\] &#10;&#10;&#10;\end{document}"/>
+  <p:tag name="IGUANATEXSIZE" val="20"/>
+  <p:tag name="IGUANATEXCURSOR" val="93"/>
+  <p:tag name="TRANSPARENCY" val="Vero"/>
+  <p:tag name="FILENAME" val=""/>
+  <p:tag name="LATEXENGINEID" val="0"/>
+  <p:tag name="TEMPFOLDER" val="c:\temp\"/>
+  <p:tag name="LATEXFORMHEIGHT" val="312"/>
+  <p:tag name="LATEXFORMWIDTH" val="384"/>
+  <p:tag name="LATEXFORMWRAP" val="Vero"/>
+  <p:tag name="BITMAPVECTOR" val="0"/>
+</p:tagLst>
+</file>
+
+<file path=ppt/tags/tag36.xml><?xml version="1.0" encoding="utf-8"?>
+<p:tagLst xmlns:a="http://schemas.openxmlformats.org/drawingml/2006/main" xmlns:r="http://schemas.openxmlformats.org/officeDocument/2006/relationships" xmlns:p="http://schemas.openxmlformats.org/presentationml/2006/main">
+  <p:tag name="OUTPUTDPI" val="1200"/>
+  <p:tag name="ORIGINALHEIGHT" val="140,9824"/>
+  <p:tag name="ORIGINALWIDTH" val="3805,774"/>
+  <p:tag name="LATEXADDIN" val="\documentclass{article}&#10;\usepackage{amsmath}&#10;\pagestyle{empty}&#10;\begin{document}&#10;&#10;&#10;\[T(NeighborJoining)=T(step1)+T(step2)=O(n^2)+O(n)=O(n^2)\]&#10;&#10;\end{document}"/>
+  <p:tag name="IGUANATEXSIZE" val="20"/>
+  <p:tag name="IGUANATEXCURSOR" val="120"/>
+  <p:tag name="TRANSPARENCY" val="Vero"/>
+  <p:tag name="FILENAME" val=""/>
+  <p:tag name="LATEXENGINEID" val="0"/>
+  <p:tag name="TEMPFOLDER" val="c:\temp\"/>
+  <p:tag name="LATEXFORMHEIGHT" val="312"/>
+  <p:tag name="LATEXFORMWIDTH" val="384"/>
+  <p:tag name="LATEXFORMWRAP" val="Vero"/>
+  <p:tag name="BITMAPVECTOR" val="0"/>
+</p:tagLst>
+</file>
+
+<file path=ppt/tags/tag37.xml><?xml version="1.0" encoding="utf-8"?>
+<p:tagLst xmlns:a="http://schemas.openxmlformats.org/drawingml/2006/main" xmlns:r="http://schemas.openxmlformats.org/officeDocument/2006/relationships" xmlns:p="http://schemas.openxmlformats.org/presentationml/2006/main">
+  <p:tag name="OUTPUTDPI" val="1200"/>
+  <p:tag name="ORIGINALHEIGHT" val="140,9824"/>
+  <p:tag name="ORIGINALWIDTH" val="2761,155"/>
+  <p:tag name="LATEXADDIN" val="\documentclass{article}&#10;\usepackage{amsmath}&#10;\pagestyle{empty}&#10;\begin{document}&#10;&#10;&#10;\[T(Totale)=T(NeighborJoining) \times O(n)= O(n^3)\]&#10;&#10;\end{document}"/>
+  <p:tag name="IGUANATEXSIZE" val="20"/>
+  <p:tag name="IGUANATEXCURSOR" val="132"/>
   <p:tag name="TRANSPARENCY" val="Vero"/>
   <p:tag name="FILENAME" val=""/>
   <p:tag name="LATEXENGINEID" val="0"/>

</xml_diff>